<commit_message>
Update Github workflow big picture
Adding more detail of: $ git commit --amend
</commit_message>
<xml_diff>
--- a/contributing_guide/images/github_workflow.pptx
+++ b/contributing_guide/images/github_workflow.pptx
@@ -6,6 +6,7 @@
   </p:sldMasterIdLst>
   <p:sldIdLst>
     <p:sldId id="256" r:id="rId2"/>
+    <p:sldId id="257" r:id="rId3"/>
   </p:sldIdLst>
   <p:sldSz cx="12192000" cy="6858000"/>
   <p:notesSz cx="6858000" cy="9144000"/>
@@ -243,7 +244,7 @@
           <a:p>
             <a:fld id="{F647C0CB-243C-40A8-A52B-B3AFA80F3996}" type="datetimeFigureOut">
               <a:rPr lang="en-US" smtClean="0"/>
-              <a:t>11/15/2018</a:t>
+              <a:t>11/30/2018</a:t>
             </a:fld>
             <a:endParaRPr lang="en-US"/>
           </a:p>
@@ -413,7 +414,7 @@
           <a:p>
             <a:fld id="{F647C0CB-243C-40A8-A52B-B3AFA80F3996}" type="datetimeFigureOut">
               <a:rPr lang="en-US" smtClean="0"/>
-              <a:t>11/15/2018</a:t>
+              <a:t>11/30/2018</a:t>
             </a:fld>
             <a:endParaRPr lang="en-US"/>
           </a:p>
@@ -593,7 +594,7 @@
           <a:p>
             <a:fld id="{F647C0CB-243C-40A8-A52B-B3AFA80F3996}" type="datetimeFigureOut">
               <a:rPr lang="en-US" smtClean="0"/>
-              <a:t>11/15/2018</a:t>
+              <a:t>11/30/2018</a:t>
             </a:fld>
             <a:endParaRPr lang="en-US"/>
           </a:p>
@@ -763,7 +764,7 @@
           <a:p>
             <a:fld id="{F647C0CB-243C-40A8-A52B-B3AFA80F3996}" type="datetimeFigureOut">
               <a:rPr lang="en-US" smtClean="0"/>
-              <a:t>11/15/2018</a:t>
+              <a:t>11/30/2018</a:t>
             </a:fld>
             <a:endParaRPr lang="en-US"/>
           </a:p>
@@ -1009,7 +1010,7 @@
           <a:p>
             <a:fld id="{F647C0CB-243C-40A8-A52B-B3AFA80F3996}" type="datetimeFigureOut">
               <a:rPr lang="en-US" smtClean="0"/>
-              <a:t>11/15/2018</a:t>
+              <a:t>11/30/2018</a:t>
             </a:fld>
             <a:endParaRPr lang="en-US"/>
           </a:p>
@@ -1241,7 +1242,7 @@
           <a:p>
             <a:fld id="{F647C0CB-243C-40A8-A52B-B3AFA80F3996}" type="datetimeFigureOut">
               <a:rPr lang="en-US" smtClean="0"/>
-              <a:t>11/15/2018</a:t>
+              <a:t>11/30/2018</a:t>
             </a:fld>
             <a:endParaRPr lang="en-US"/>
           </a:p>
@@ -1608,7 +1609,7 @@
           <a:p>
             <a:fld id="{F647C0CB-243C-40A8-A52B-B3AFA80F3996}" type="datetimeFigureOut">
               <a:rPr lang="en-US" smtClean="0"/>
-              <a:t>11/15/2018</a:t>
+              <a:t>11/30/2018</a:t>
             </a:fld>
             <a:endParaRPr lang="en-US"/>
           </a:p>
@@ -1726,7 +1727,7 @@
           <a:p>
             <a:fld id="{F647C0CB-243C-40A8-A52B-B3AFA80F3996}" type="datetimeFigureOut">
               <a:rPr lang="en-US" smtClean="0"/>
-              <a:t>11/15/2018</a:t>
+              <a:t>11/30/2018</a:t>
             </a:fld>
             <a:endParaRPr lang="en-US"/>
           </a:p>
@@ -1821,7 +1822,7 @@
           <a:p>
             <a:fld id="{F647C0CB-243C-40A8-A52B-B3AFA80F3996}" type="datetimeFigureOut">
               <a:rPr lang="en-US" smtClean="0"/>
-              <a:t>11/15/2018</a:t>
+              <a:t>11/30/2018</a:t>
             </a:fld>
             <a:endParaRPr lang="en-US"/>
           </a:p>
@@ -2098,7 +2099,7 @@
           <a:p>
             <a:fld id="{F647C0CB-243C-40A8-A52B-B3AFA80F3996}" type="datetimeFigureOut">
               <a:rPr lang="en-US" smtClean="0"/>
-              <a:t>11/15/2018</a:t>
+              <a:t>11/30/2018</a:t>
             </a:fld>
             <a:endParaRPr lang="en-US"/>
           </a:p>
@@ -2351,7 +2352,7 @@
           <a:p>
             <a:fld id="{F647C0CB-243C-40A8-A52B-B3AFA80F3996}" type="datetimeFigureOut">
               <a:rPr lang="en-US" smtClean="0"/>
-              <a:t>11/15/2018</a:t>
+              <a:t>11/30/2018</a:t>
             </a:fld>
             <a:endParaRPr lang="en-US"/>
           </a:p>
@@ -2564,7 +2565,7 @@
           <a:p>
             <a:fld id="{F647C0CB-243C-40A8-A52B-B3AFA80F3996}" type="datetimeFigureOut">
               <a:rPr lang="en-US" smtClean="0"/>
-              <a:t>11/15/2018</a:t>
+              <a:t>11/30/2018</a:t>
             </a:fld>
             <a:endParaRPr lang="en-US"/>
           </a:p>
@@ -3392,23 +3393,7 @@
                   <a:srgbClr val="0070C0"/>
                 </a:solidFill>
               </a:rPr>
-              <a:t>Step </a:t>
-            </a:r>
-            <a:r>
-              <a:rPr lang="en-US" sz="1200" b="1" dirty="0" smtClean="0">
-                <a:solidFill>
-                  <a:srgbClr val="0070C0"/>
-                </a:solidFill>
-              </a:rPr>
-              <a:t>1</a:t>
-            </a:r>
-            <a:r>
-              <a:rPr lang="en-US" sz="1200" b="1" dirty="0" smtClean="0">
-                <a:solidFill>
-                  <a:srgbClr val="0070C0"/>
-                </a:solidFill>
-              </a:rPr>
-              <a:t>.</a:t>
+              <a:t>Step 1.</a:t>
             </a:r>
             <a:r>
               <a:rPr lang="en-US" sz="1200" dirty="0" smtClean="0">
@@ -3621,15 +3606,7 @@
                   <a:srgbClr val="0070C0"/>
                 </a:solidFill>
               </a:rPr>
-              <a:t>Step 2</a:t>
-            </a:r>
-            <a:r>
-              <a:rPr lang="en-US" sz="1200" b="1" dirty="0" smtClean="0">
-                <a:solidFill>
-                  <a:srgbClr val="0070C0"/>
-                </a:solidFill>
-              </a:rPr>
-              <a:t>. </a:t>
+              <a:t>Step 2. </a:t>
             </a:r>
             <a:r>
               <a:rPr lang="en-US" sz="1200" b="1" dirty="0" smtClean="0">
@@ -3637,9 +3614,6 @@
               </a:rPr>
               <a:t>Clone the forked repo to your local working directory </a:t>
             </a:r>
-            <a:endParaRPr lang="en-US" sz="1200" b="1" dirty="0" smtClean="0">
-              <a:cs typeface="Courier New" panose="02070309020205020404" pitchFamily="49" charset="0"/>
-            </a:endParaRPr>
           </a:p>
         </p:txBody>
       </p:sp>
@@ -3749,15 +3723,7 @@
                   <a:srgbClr val="0070C0"/>
                 </a:solidFill>
               </a:rPr>
-              <a:t>Step 4</a:t>
-            </a:r>
-            <a:r>
-              <a:rPr lang="en-US" sz="1200" b="1" dirty="0" smtClean="0">
-                <a:solidFill>
-                  <a:srgbClr val="0070C0"/>
-                </a:solidFill>
-              </a:rPr>
-              <a:t>. </a:t>
+              <a:t>Step 4. </a:t>
             </a:r>
             <a:r>
               <a:rPr lang="en-US" sz="1200" b="1" dirty="0"/>
@@ -3907,15 +3873,7 @@
                   <a:srgbClr val="0070C0"/>
                 </a:solidFill>
               </a:rPr>
-              <a:t>Step 3</a:t>
-            </a:r>
-            <a:r>
-              <a:rPr lang="en-US" sz="1200" b="1" dirty="0" smtClean="0">
-                <a:solidFill>
-                  <a:srgbClr val="0070C0"/>
-                </a:solidFill>
-              </a:rPr>
-              <a:t>. </a:t>
+              <a:t>Step 3. </a:t>
             </a:r>
             <a:r>
               <a:rPr lang="en-US" sz="1200" b="1" dirty="0" smtClean="0"/>
@@ -4162,15 +4120,7 @@
                   <a:srgbClr val="0070C0"/>
                 </a:solidFill>
               </a:rPr>
-              <a:t>Step 5</a:t>
-            </a:r>
-            <a:r>
-              <a:rPr lang="en-US" sz="1200" b="1" dirty="0" smtClean="0">
-                <a:solidFill>
-                  <a:srgbClr val="0070C0"/>
-                </a:solidFill>
-              </a:rPr>
-              <a:t>. </a:t>
+              <a:t>Step 5. </a:t>
             </a:r>
             <a:r>
               <a:rPr lang="en-US" sz="1200" b="1" dirty="0" smtClean="0"/>
@@ -4309,15 +4259,7 @@
                   <a:srgbClr val="0070C0"/>
                 </a:solidFill>
               </a:rPr>
-              <a:t>Step 6</a:t>
-            </a:r>
-            <a:r>
-              <a:rPr lang="en-US" sz="1200" b="1" dirty="0" smtClean="0">
-                <a:solidFill>
-                  <a:srgbClr val="0070C0"/>
-                </a:solidFill>
-              </a:rPr>
-              <a:t>. </a:t>
+              <a:t>Step 6. </a:t>
             </a:r>
             <a:r>
               <a:rPr lang="en-US" sz="1200" b="1" dirty="0" smtClean="0"/>
@@ -4486,6 +4428,2815 @@
     <p:extLst>
       <p:ext uri="{BB962C8B-B14F-4D97-AF65-F5344CB8AC3E}">
         <p14:creationId xmlns:p14="http://schemas.microsoft.com/office/powerpoint/2010/main" val="2584186473"/>
+      </p:ext>
+    </p:extLst>
+  </p:cSld>
+  <p:clrMapOvr>
+    <a:masterClrMapping/>
+  </p:clrMapOvr>
+</p:sld>
+</file>
+
+<file path=ppt/slides/slide2.xml><?xml version="1.0" encoding="utf-8"?>
+<p:sld xmlns:a="http://schemas.openxmlformats.org/drawingml/2006/main" xmlns:r="http://schemas.openxmlformats.org/officeDocument/2006/relationships" xmlns:p="http://schemas.openxmlformats.org/presentationml/2006/main">
+  <p:cSld>
+    <p:spTree>
+      <p:nvGrpSpPr>
+        <p:cNvPr id="1" name=""/>
+        <p:cNvGrpSpPr/>
+        <p:nvPr/>
+      </p:nvGrpSpPr>
+      <p:grpSpPr>
+        <a:xfrm>
+          <a:off x="0" y="0"/>
+          <a:ext cx="0" cy="0"/>
+          <a:chOff x="0" y="0"/>
+          <a:chExt cx="0" cy="0"/>
+        </a:xfrm>
+      </p:grpSpPr>
+      <p:sp>
+        <p:nvSpPr>
+          <p:cNvPr id="4" name="Rectangle 3"/>
+          <p:cNvSpPr/>
+          <p:nvPr/>
+        </p:nvSpPr>
+        <p:spPr>
+          <a:xfrm>
+            <a:off x="890324" y="116237"/>
+            <a:ext cx="10927134" cy="3522991"/>
+          </a:xfrm>
+          <a:prstGeom prst="rect">
+            <a:avLst/>
+          </a:prstGeom>
+          <a:solidFill>
+            <a:srgbClr val="70AD47">
+              <a:lumMod val="20000"/>
+              <a:lumOff val="80000"/>
+            </a:srgbClr>
+          </a:solidFill>
+          <a:ln w="12700" cap="flat" cmpd="sng" algn="ctr">
+            <a:noFill/>
+            <a:prstDash val="solid"/>
+            <a:miter lim="800000"/>
+          </a:ln>
+          <a:effectLst/>
+        </p:spPr>
+        <p:txBody>
+          <a:bodyPr rtlCol="0" anchor="ctr"/>
+          <a:lstStyle/>
+          <a:p>
+            <a:pPr marL="0" marR="0" lvl="0" indent="0" algn="ctr" defTabSz="685800" eaLnBrk="1" fontAlgn="auto" latinLnBrk="0" hangingPunct="1">
+              <a:lnSpc>
+                <a:spcPct val="100000"/>
+              </a:lnSpc>
+              <a:spcBef>
+                <a:spcPts val="0"/>
+              </a:spcBef>
+              <a:spcAft>
+                <a:spcPts val="0"/>
+              </a:spcAft>
+              <a:buClrTx/>
+              <a:buSzTx/>
+              <a:buFontTx/>
+              <a:buNone/>
+              <a:tabLst/>
+              <a:defRPr/>
+            </a:pPr>
+            <a:endParaRPr kumimoji="0" lang="en-US" sz="1200" b="1" i="0" u="none" strike="noStrike" kern="0" cap="none" spc="0" normalizeH="0" baseline="0" noProof="0" dirty="0" smtClean="0">
+              <a:ln>
+                <a:noFill/>
+              </a:ln>
+              <a:solidFill>
+                <a:srgbClr val="0070C0"/>
+              </a:solidFill>
+              <a:effectLst/>
+              <a:uLnTx/>
+              <a:uFillTx/>
+              <a:latin typeface="Calibri" panose="020F0502020204030204"/>
+              <a:ea typeface="+mn-ea"/>
+              <a:cs typeface="+mn-cs"/>
+            </a:endParaRPr>
+          </a:p>
+        </p:txBody>
+      </p:sp>
+      <p:sp>
+        <p:nvSpPr>
+          <p:cNvPr id="5" name="Rectangle 4"/>
+          <p:cNvSpPr/>
+          <p:nvPr/>
+        </p:nvSpPr>
+        <p:spPr>
+          <a:xfrm>
+            <a:off x="890323" y="3740105"/>
+            <a:ext cx="10927134" cy="3066624"/>
+          </a:xfrm>
+          <a:prstGeom prst="rect">
+            <a:avLst/>
+          </a:prstGeom>
+          <a:solidFill>
+            <a:srgbClr val="4472C4">
+              <a:lumMod val="20000"/>
+              <a:lumOff val="80000"/>
+            </a:srgbClr>
+          </a:solidFill>
+          <a:ln w="12700" cap="flat" cmpd="sng" algn="ctr">
+            <a:noFill/>
+            <a:prstDash val="solid"/>
+            <a:miter lim="800000"/>
+          </a:ln>
+          <a:effectLst/>
+        </p:spPr>
+        <p:txBody>
+          <a:bodyPr rtlCol="0" anchor="ctr"/>
+          <a:lstStyle/>
+          <a:p>
+            <a:pPr marL="0" marR="0" lvl="0" indent="0" defTabSz="685800" eaLnBrk="1" fontAlgn="auto" latinLnBrk="0" hangingPunct="1">
+              <a:lnSpc>
+                <a:spcPct val="100000"/>
+              </a:lnSpc>
+              <a:spcBef>
+                <a:spcPts val="0"/>
+              </a:spcBef>
+              <a:spcAft>
+                <a:spcPts val="0"/>
+              </a:spcAft>
+              <a:buClrTx/>
+              <a:buSzTx/>
+              <a:buFontTx/>
+              <a:buNone/>
+              <a:tabLst/>
+              <a:defRPr/>
+            </a:pPr>
+            <a:endParaRPr kumimoji="0" lang="en-US" altLang="en-US" sz="1200" b="0" i="0" u="none" strike="noStrike" kern="0" cap="none" spc="0" normalizeH="0" baseline="0" noProof="0" dirty="0" smtClean="0">
+              <a:ln>
+                <a:noFill/>
+              </a:ln>
+              <a:solidFill>
+                <a:prstClr val="black">
+                  <a:lumMod val="75000"/>
+                  <a:lumOff val="25000"/>
+                </a:prstClr>
+              </a:solidFill>
+              <a:effectLst/>
+              <a:uLnTx/>
+              <a:uFillTx/>
+              <a:latin typeface="Calibri" panose="020F0502020204030204"/>
+              <a:ea typeface="+mn-ea"/>
+              <a:cs typeface="+mn-cs"/>
+            </a:endParaRPr>
+          </a:p>
+        </p:txBody>
+      </p:sp>
+      <p:sp>
+        <p:nvSpPr>
+          <p:cNvPr id="6" name="Rounded Rectangle 5"/>
+          <p:cNvSpPr/>
+          <p:nvPr/>
+        </p:nvSpPr>
+        <p:spPr>
+          <a:xfrm>
+            <a:off x="1340603" y="393572"/>
+            <a:ext cx="3432875" cy="296405"/>
+          </a:xfrm>
+          <a:prstGeom prst="roundRect">
+            <a:avLst/>
+          </a:prstGeom>
+          <a:solidFill>
+            <a:srgbClr val="ED7D31">
+              <a:lumMod val="40000"/>
+              <a:lumOff val="60000"/>
+            </a:srgbClr>
+          </a:solidFill>
+          <a:ln w="9525" cap="flat" cmpd="sng" algn="ctr">
+            <a:solidFill>
+              <a:srgbClr val="FF9966"/>
+            </a:solidFill>
+            <a:prstDash val="solid"/>
+            <a:miter lim="800000"/>
+          </a:ln>
+          <a:effectLst/>
+        </p:spPr>
+        <p:txBody>
+          <a:bodyPr rtlCol="0" anchor="ctr"/>
+          <a:lstStyle/>
+          <a:p>
+            <a:pPr marL="0" marR="0" lvl="0" indent="0" algn="ctr" defTabSz="685800" eaLnBrk="1" fontAlgn="auto" latinLnBrk="0" hangingPunct="1">
+              <a:lnSpc>
+                <a:spcPct val="100000"/>
+              </a:lnSpc>
+              <a:spcBef>
+                <a:spcPts val="0"/>
+              </a:spcBef>
+              <a:spcAft>
+                <a:spcPts val="0"/>
+              </a:spcAft>
+              <a:buClrTx/>
+              <a:buSzTx/>
+              <a:buFontTx/>
+              <a:buNone/>
+              <a:tabLst/>
+              <a:defRPr/>
+            </a:pPr>
+            <a:endParaRPr kumimoji="0" lang="en-US" sz="1200" b="0" i="0" u="none" strike="noStrike" kern="0" cap="none" spc="0" normalizeH="0" baseline="0" noProof="0" dirty="0" smtClean="0">
+              <a:ln>
+                <a:noFill/>
+              </a:ln>
+              <a:solidFill>
+                <a:prstClr val="white"/>
+              </a:solidFill>
+              <a:effectLst/>
+              <a:uLnTx/>
+              <a:uFillTx/>
+              <a:latin typeface="Calibri" panose="020F0502020204030204"/>
+              <a:ea typeface="+mn-ea"/>
+              <a:cs typeface="+mn-cs"/>
+            </a:endParaRPr>
+          </a:p>
+          <a:p>
+            <a:pPr marL="0" marR="0" lvl="0" indent="0" defTabSz="685800" eaLnBrk="1" fontAlgn="auto" latinLnBrk="0" hangingPunct="1">
+              <a:lnSpc>
+                <a:spcPct val="100000"/>
+              </a:lnSpc>
+              <a:spcBef>
+                <a:spcPts val="0"/>
+              </a:spcBef>
+              <a:spcAft>
+                <a:spcPts val="0"/>
+              </a:spcAft>
+              <a:buClrTx/>
+              <a:buSzTx/>
+              <a:buFontTx/>
+              <a:buNone/>
+              <a:tabLst/>
+              <a:defRPr/>
+            </a:pPr>
+            <a:r>
+              <a:rPr kumimoji="0" lang="en-US" sz="1200" b="0" i="0" u="none" strike="noStrike" kern="0" cap="none" spc="0" normalizeH="0" baseline="0" noProof="0" dirty="0" smtClean="0">
+                <a:ln>
+                  <a:noFill/>
+                </a:ln>
+                <a:solidFill>
+                  <a:prstClr val="black"/>
+                </a:solidFill>
+                <a:effectLst/>
+                <a:uLnTx/>
+                <a:uFillTx/>
+                <a:latin typeface="Calibri" panose="020F0502020204030204"/>
+                <a:ea typeface="+mn-ea"/>
+                <a:cs typeface="+mn-cs"/>
+              </a:rPr>
+              <a:t>https://github.com/kubernetes/kubernetes</a:t>
+            </a:r>
+          </a:p>
+          <a:p>
+            <a:pPr marL="0" marR="0" lvl="0" indent="0" algn="ctr" defTabSz="685800" eaLnBrk="1" fontAlgn="auto" latinLnBrk="0" hangingPunct="1">
+              <a:lnSpc>
+                <a:spcPct val="100000"/>
+              </a:lnSpc>
+              <a:spcBef>
+                <a:spcPts val="0"/>
+              </a:spcBef>
+              <a:spcAft>
+                <a:spcPts val="0"/>
+              </a:spcAft>
+              <a:buClrTx/>
+              <a:buSzTx/>
+              <a:buFontTx/>
+              <a:buNone/>
+              <a:tabLst/>
+              <a:defRPr/>
+            </a:pPr>
+            <a:endParaRPr kumimoji="0" lang="en-US" sz="1200" b="0" i="0" u="none" strike="noStrike" kern="0" cap="none" spc="0" normalizeH="0" baseline="0" noProof="0" dirty="0" smtClean="0">
+              <a:ln>
+                <a:noFill/>
+              </a:ln>
+              <a:solidFill>
+                <a:prstClr val="white"/>
+              </a:solidFill>
+              <a:effectLst/>
+              <a:uLnTx/>
+              <a:uFillTx/>
+              <a:latin typeface="Calibri" panose="020F0502020204030204"/>
+              <a:ea typeface="+mn-ea"/>
+              <a:cs typeface="+mn-cs"/>
+            </a:endParaRPr>
+          </a:p>
+        </p:txBody>
+      </p:sp>
+      <p:sp>
+        <p:nvSpPr>
+          <p:cNvPr id="7" name="TextBox 6"/>
+          <p:cNvSpPr txBox="1"/>
+          <p:nvPr/>
+        </p:nvSpPr>
+        <p:spPr>
+          <a:xfrm>
+            <a:off x="68635" y="1951899"/>
+            <a:ext cx="623679" cy="276999"/>
+          </a:xfrm>
+          <a:prstGeom prst="rect">
+            <a:avLst/>
+          </a:prstGeom>
+          <a:noFill/>
+        </p:spPr>
+        <p:txBody>
+          <a:bodyPr wrap="square" rtlCol="0">
+            <a:spAutoFit/>
+          </a:bodyPr>
+          <a:lstStyle/>
+          <a:p>
+            <a:pPr algn="r" defTabSz="685800" fontAlgn="auto">
+              <a:spcBef>
+                <a:spcPts val="0"/>
+              </a:spcBef>
+              <a:spcAft>
+                <a:spcPts val="0"/>
+              </a:spcAft>
+            </a:pPr>
+            <a:r>
+              <a:rPr kumimoji="0" lang="en-US" sz="1200" b="1" dirty="0" err="1">
+                <a:solidFill>
+                  <a:prstClr val="black"/>
+                </a:solidFill>
+                <a:latin typeface="Calibri" panose="020F0502020204030204"/>
+              </a:rPr>
+              <a:t>Github</a:t>
+            </a:r>
+            <a:endParaRPr kumimoji="0" lang="en-US" sz="1200" b="1" dirty="0">
+              <a:solidFill>
+                <a:prstClr val="black"/>
+              </a:solidFill>
+              <a:latin typeface="Calibri" panose="020F0502020204030204"/>
+            </a:endParaRPr>
+          </a:p>
+        </p:txBody>
+      </p:sp>
+      <p:sp>
+        <p:nvSpPr>
+          <p:cNvPr id="8" name="TextBox 7"/>
+          <p:cNvSpPr txBox="1"/>
+          <p:nvPr/>
+        </p:nvSpPr>
+        <p:spPr>
+          <a:xfrm>
+            <a:off x="108880" y="4959637"/>
+            <a:ext cx="781443" cy="646331"/>
+          </a:xfrm>
+          <a:prstGeom prst="rect">
+            <a:avLst/>
+          </a:prstGeom>
+          <a:noFill/>
+        </p:spPr>
+        <p:txBody>
+          <a:bodyPr wrap="square" rtlCol="0">
+            <a:spAutoFit/>
+          </a:bodyPr>
+          <a:lstStyle/>
+          <a:p>
+            <a:pPr defTabSz="685800" fontAlgn="auto">
+              <a:spcBef>
+                <a:spcPts val="0"/>
+              </a:spcBef>
+              <a:spcAft>
+                <a:spcPts val="0"/>
+              </a:spcAft>
+            </a:pPr>
+            <a:r>
+              <a:rPr kumimoji="0" lang="en-US" sz="1200" b="1" dirty="0" smtClean="0">
+                <a:solidFill>
+                  <a:prstClr val="black"/>
+                </a:solidFill>
+                <a:latin typeface="Calibri" panose="020F0502020204030204"/>
+              </a:rPr>
+              <a:t>Local</a:t>
+            </a:r>
+          </a:p>
+          <a:p>
+            <a:pPr defTabSz="685800" fontAlgn="auto">
+              <a:spcBef>
+                <a:spcPts val="0"/>
+              </a:spcBef>
+              <a:spcAft>
+                <a:spcPts val="0"/>
+              </a:spcAft>
+            </a:pPr>
+            <a:r>
+              <a:rPr kumimoji="0" lang="en-US" sz="1200" b="1" dirty="0" smtClean="0">
+                <a:solidFill>
+                  <a:prstClr val="black"/>
+                </a:solidFill>
+                <a:latin typeface="Calibri" panose="020F0502020204030204"/>
+              </a:rPr>
+              <a:t>working</a:t>
+            </a:r>
+          </a:p>
+          <a:p>
+            <a:pPr defTabSz="685800" fontAlgn="auto">
+              <a:spcBef>
+                <a:spcPts val="0"/>
+              </a:spcBef>
+              <a:spcAft>
+                <a:spcPts val="0"/>
+              </a:spcAft>
+            </a:pPr>
+            <a:r>
+              <a:rPr kumimoji="0" lang="en-US" sz="1200" b="1" dirty="0" smtClean="0">
+                <a:solidFill>
+                  <a:prstClr val="black"/>
+                </a:solidFill>
+                <a:latin typeface="Calibri" panose="020F0502020204030204"/>
+              </a:rPr>
+              <a:t>directory</a:t>
+            </a:r>
+            <a:endParaRPr kumimoji="0" lang="en-US" sz="1200" b="1" dirty="0">
+              <a:solidFill>
+                <a:prstClr val="black"/>
+              </a:solidFill>
+              <a:latin typeface="Calibri" panose="020F0502020204030204"/>
+            </a:endParaRPr>
+          </a:p>
+        </p:txBody>
+      </p:sp>
+      <p:sp>
+        <p:nvSpPr>
+          <p:cNvPr id="9" name="Rounded Rectangle 8"/>
+          <p:cNvSpPr/>
+          <p:nvPr/>
+        </p:nvSpPr>
+        <p:spPr>
+          <a:xfrm>
+            <a:off x="6145078" y="859059"/>
+            <a:ext cx="3261983" cy="296405"/>
+          </a:xfrm>
+          <a:prstGeom prst="roundRect">
+            <a:avLst/>
+          </a:prstGeom>
+          <a:solidFill>
+            <a:srgbClr val="70AD47">
+              <a:lumMod val="60000"/>
+              <a:lumOff val="40000"/>
+            </a:srgbClr>
+          </a:solidFill>
+          <a:ln w="9525" cap="flat" cmpd="sng" algn="ctr">
+            <a:solidFill>
+              <a:srgbClr val="7AB850"/>
+            </a:solidFill>
+            <a:prstDash val="solid"/>
+            <a:miter lim="800000"/>
+          </a:ln>
+          <a:effectLst/>
+        </p:spPr>
+        <p:txBody>
+          <a:bodyPr rtlCol="0" anchor="ctr"/>
+          <a:lstStyle/>
+          <a:p>
+            <a:pPr marL="0" marR="0" lvl="0" indent="0" algn="ctr" defTabSz="685800" eaLnBrk="1" fontAlgn="auto" latinLnBrk="0" hangingPunct="1">
+              <a:lnSpc>
+                <a:spcPct val="100000"/>
+              </a:lnSpc>
+              <a:spcBef>
+                <a:spcPts val="0"/>
+              </a:spcBef>
+              <a:spcAft>
+                <a:spcPts val="0"/>
+              </a:spcAft>
+              <a:buClrTx/>
+              <a:buSzTx/>
+              <a:buFontTx/>
+              <a:buNone/>
+              <a:tabLst/>
+              <a:defRPr/>
+            </a:pPr>
+            <a:endParaRPr kumimoji="0" lang="en-US" sz="1200" b="0" i="0" u="none" strike="noStrike" kern="0" cap="none" spc="0" normalizeH="0" baseline="0" noProof="0" dirty="0" smtClean="0">
+              <a:ln>
+                <a:noFill/>
+              </a:ln>
+              <a:solidFill>
+                <a:prstClr val="white"/>
+              </a:solidFill>
+              <a:effectLst/>
+              <a:uLnTx/>
+              <a:uFillTx/>
+              <a:latin typeface="Calibri" panose="020F0502020204030204"/>
+              <a:ea typeface="+mn-ea"/>
+              <a:cs typeface="+mn-cs"/>
+            </a:endParaRPr>
+          </a:p>
+          <a:p>
+            <a:pPr marL="0" marR="0" lvl="0" indent="0" algn="ctr" defTabSz="685800" eaLnBrk="1" fontAlgn="auto" latinLnBrk="0" hangingPunct="1">
+              <a:lnSpc>
+                <a:spcPct val="100000"/>
+              </a:lnSpc>
+              <a:spcBef>
+                <a:spcPts val="0"/>
+              </a:spcBef>
+              <a:spcAft>
+                <a:spcPts val="0"/>
+              </a:spcAft>
+              <a:buClrTx/>
+              <a:buSzTx/>
+              <a:buFontTx/>
+              <a:buNone/>
+              <a:tabLst/>
+              <a:defRPr/>
+            </a:pPr>
+            <a:r>
+              <a:rPr kumimoji="0" lang="en-US" sz="1200" b="0" i="0" u="none" strike="noStrike" kern="0" cap="none" spc="0" normalizeH="0" baseline="0" noProof="0" dirty="0" smtClean="0">
+                <a:ln>
+                  <a:noFill/>
+                </a:ln>
+                <a:solidFill>
+                  <a:prstClr val="black"/>
+                </a:solidFill>
+                <a:effectLst/>
+                <a:uLnTx/>
+                <a:uFillTx/>
+                <a:latin typeface="Calibri" panose="020F0502020204030204"/>
+                <a:ea typeface="+mn-ea"/>
+                <a:cs typeface="+mn-cs"/>
+              </a:rPr>
+              <a:t>https://github.com</a:t>
+            </a:r>
+            <a:r>
+              <a:rPr kumimoji="0" lang="en-US" sz="1200" i="0" u="none" strike="noStrike" kern="0" cap="none" spc="0" normalizeH="0" baseline="0" noProof="0" dirty="0" smtClean="0">
+                <a:ln>
+                  <a:noFill/>
+                </a:ln>
+                <a:solidFill>
+                  <a:prstClr val="black"/>
+                </a:solidFill>
+                <a:effectLst/>
+                <a:uLnTx/>
+                <a:uFillTx/>
+                <a:latin typeface="Calibri" panose="020F0502020204030204"/>
+                <a:ea typeface="+mn-ea"/>
+                <a:cs typeface="+mn-cs"/>
+              </a:rPr>
+              <a:t>/</a:t>
+            </a:r>
+            <a:r>
+              <a:rPr kumimoji="0" lang="en-US" sz="1200" b="1" i="0" u="none" strike="noStrike" kern="0" cap="none" spc="0" normalizeH="0" baseline="0" noProof="0" dirty="0" smtClean="0">
+                <a:ln>
+                  <a:noFill/>
+                </a:ln>
+                <a:solidFill>
+                  <a:prstClr val="black"/>
+                </a:solidFill>
+                <a:effectLst/>
+                <a:uLnTx/>
+                <a:uFillTx/>
+                <a:latin typeface="Calibri" panose="020F0502020204030204"/>
+                <a:ea typeface="+mn-ea"/>
+                <a:cs typeface="+mn-cs"/>
+              </a:rPr>
+              <a:t>$user</a:t>
+            </a:r>
+            <a:r>
+              <a:rPr kumimoji="0" lang="en-US" sz="1200" b="0" i="0" u="none" strike="noStrike" kern="0" cap="none" spc="0" normalizeH="0" baseline="0" noProof="0" dirty="0" smtClean="0">
+                <a:ln>
+                  <a:noFill/>
+                </a:ln>
+                <a:solidFill>
+                  <a:prstClr val="black"/>
+                </a:solidFill>
+                <a:effectLst/>
+                <a:uLnTx/>
+                <a:uFillTx/>
+                <a:latin typeface="Calibri" panose="020F0502020204030204"/>
+                <a:ea typeface="+mn-ea"/>
+                <a:cs typeface="+mn-cs"/>
+              </a:rPr>
+              <a:t>/kubernetes</a:t>
+            </a:r>
+          </a:p>
+          <a:p>
+            <a:pPr marL="0" marR="0" lvl="0" indent="0" algn="ctr" defTabSz="685800" eaLnBrk="1" fontAlgn="auto" latinLnBrk="0" hangingPunct="1">
+              <a:lnSpc>
+                <a:spcPct val="100000"/>
+              </a:lnSpc>
+              <a:spcBef>
+                <a:spcPts val="0"/>
+              </a:spcBef>
+              <a:spcAft>
+                <a:spcPts val="0"/>
+              </a:spcAft>
+              <a:buClrTx/>
+              <a:buSzTx/>
+              <a:buFontTx/>
+              <a:buNone/>
+              <a:tabLst/>
+              <a:defRPr/>
+            </a:pPr>
+            <a:endParaRPr kumimoji="0" lang="en-US" sz="1200" b="0" i="0" u="none" strike="noStrike" kern="0" cap="none" spc="0" normalizeH="0" baseline="0" noProof="0" dirty="0" smtClean="0">
+              <a:ln>
+                <a:noFill/>
+              </a:ln>
+              <a:solidFill>
+                <a:prstClr val="white"/>
+              </a:solidFill>
+              <a:effectLst/>
+              <a:uLnTx/>
+              <a:uFillTx/>
+              <a:latin typeface="Calibri" panose="020F0502020204030204"/>
+              <a:ea typeface="+mn-ea"/>
+              <a:cs typeface="+mn-cs"/>
+            </a:endParaRPr>
+          </a:p>
+        </p:txBody>
+      </p:sp>
+      <p:sp>
+        <p:nvSpPr>
+          <p:cNvPr id="10" name="Curved Down Arrow 9"/>
+          <p:cNvSpPr/>
+          <p:nvPr/>
+        </p:nvSpPr>
+        <p:spPr>
+          <a:xfrm rot="861848">
+            <a:off x="4744615" y="434550"/>
+            <a:ext cx="1862630" cy="305104"/>
+          </a:xfrm>
+          <a:prstGeom prst="curvedDownArrow">
+            <a:avLst/>
+          </a:prstGeom>
+          <a:solidFill>
+            <a:srgbClr val="70AD47"/>
+          </a:solidFill>
+          <a:ln w="12700" cap="flat" cmpd="sng" algn="ctr">
+            <a:solidFill>
+              <a:srgbClr val="70AD47">
+                <a:shade val="50000"/>
+              </a:srgbClr>
+            </a:solidFill>
+            <a:prstDash val="solid"/>
+            <a:miter lim="800000"/>
+          </a:ln>
+          <a:effectLst/>
+        </p:spPr>
+        <p:txBody>
+          <a:bodyPr rtlCol="0" anchor="ctr"/>
+          <a:lstStyle/>
+          <a:p>
+            <a:pPr marL="0" marR="0" lvl="0" indent="0" algn="ctr" defTabSz="685800" eaLnBrk="1" fontAlgn="auto" latinLnBrk="0" hangingPunct="1">
+              <a:lnSpc>
+                <a:spcPct val="100000"/>
+              </a:lnSpc>
+              <a:spcBef>
+                <a:spcPts val="0"/>
+              </a:spcBef>
+              <a:spcAft>
+                <a:spcPts val="0"/>
+              </a:spcAft>
+              <a:buClrTx/>
+              <a:buSzTx/>
+              <a:buFontTx/>
+              <a:buNone/>
+              <a:tabLst/>
+              <a:defRPr/>
+            </a:pPr>
+            <a:endParaRPr kumimoji="0" lang="en-US" sz="1200" b="0" i="0" u="none" strike="noStrike" kern="0" cap="none" spc="0" normalizeH="0" baseline="0" noProof="0" smtClean="0">
+              <a:ln>
+                <a:noFill/>
+              </a:ln>
+              <a:solidFill>
+                <a:prstClr val="black"/>
+              </a:solidFill>
+              <a:effectLst/>
+              <a:uLnTx/>
+              <a:uFillTx/>
+              <a:latin typeface="Calibri" panose="020F0502020204030204"/>
+              <a:ea typeface="+mn-ea"/>
+              <a:cs typeface="+mn-cs"/>
+            </a:endParaRPr>
+          </a:p>
+        </p:txBody>
+      </p:sp>
+      <p:pic>
+        <p:nvPicPr>
+          <p:cNvPr id="11" name="Picture 10"/>
+          <p:cNvPicPr>
+            <a:picLocks noChangeAspect="1"/>
+          </p:cNvPicPr>
+          <p:nvPr/>
+        </p:nvPicPr>
+        <p:blipFill>
+          <a:blip r:embed="rId2"/>
+          <a:stretch>
+            <a:fillRect/>
+          </a:stretch>
+        </p:blipFill>
+        <p:spPr>
+          <a:xfrm>
+            <a:off x="5407236" y="357636"/>
+            <a:ext cx="514301" cy="239966"/>
+          </a:xfrm>
+          <a:prstGeom prst="rect">
+            <a:avLst/>
+          </a:prstGeom>
+          <a:ln>
+            <a:solidFill>
+              <a:sysClr val="windowText" lastClr="000000"/>
+            </a:solidFill>
+          </a:ln>
+        </p:spPr>
+      </p:pic>
+      <p:sp>
+        <p:nvSpPr>
+          <p:cNvPr id="12" name="TextBox 11"/>
+          <p:cNvSpPr txBox="1"/>
+          <p:nvPr/>
+        </p:nvSpPr>
+        <p:spPr>
+          <a:xfrm>
+            <a:off x="6045955" y="357036"/>
+            <a:ext cx="4934593" cy="276999"/>
+          </a:xfrm>
+          <a:prstGeom prst="rect">
+            <a:avLst/>
+          </a:prstGeom>
+          <a:noFill/>
+        </p:spPr>
+        <p:txBody>
+          <a:bodyPr wrap="square" rtlCol="0">
+            <a:spAutoFit/>
+          </a:bodyPr>
+          <a:lstStyle/>
+          <a:p>
+            <a:pPr defTabSz="685800" fontAlgn="auto">
+              <a:spcBef>
+                <a:spcPts val="0"/>
+              </a:spcBef>
+              <a:spcAft>
+                <a:spcPts val="0"/>
+              </a:spcAft>
+            </a:pPr>
+            <a:r>
+              <a:rPr kumimoji="0" lang="en-US" sz="1200" b="1" dirty="0">
+                <a:solidFill>
+                  <a:srgbClr val="FF0000"/>
+                </a:solidFill>
+                <a:latin typeface="Calibri" panose="020F0502020204030204"/>
+              </a:rPr>
+              <a:t>Step 1.</a:t>
+            </a:r>
+            <a:r>
+              <a:rPr kumimoji="0" lang="en-US" sz="1200" dirty="0">
+                <a:solidFill>
+                  <a:srgbClr val="0070C0"/>
+                </a:solidFill>
+                <a:latin typeface="Calibri" panose="020F0502020204030204"/>
+              </a:rPr>
+              <a:t> </a:t>
+            </a:r>
+            <a:r>
+              <a:rPr kumimoji="0" lang="en-US" sz="1200" b="1" dirty="0">
+                <a:solidFill>
+                  <a:prstClr val="black"/>
+                </a:solidFill>
+                <a:latin typeface="Calibri" panose="020F0502020204030204"/>
+                <a:cs typeface="Courier New" panose="02070309020205020404" pitchFamily="49" charset="0"/>
+              </a:rPr>
+              <a:t>Fork</a:t>
+            </a:r>
+            <a:r>
+              <a:rPr kumimoji="0" lang="en-US" sz="1200" dirty="0">
+                <a:solidFill>
+                  <a:prstClr val="black"/>
+                </a:solidFill>
+                <a:latin typeface="Calibri" panose="020F0502020204030204"/>
+                <a:cs typeface="Courier New" panose="02070309020205020404" pitchFamily="49" charset="0"/>
+              </a:rPr>
+              <a:t> your own copy of repo </a:t>
+            </a:r>
+            <a:r>
+              <a:rPr kumimoji="0" lang="en-US" sz="1200" b="1" dirty="0" err="1">
+                <a:solidFill>
+                  <a:prstClr val="black"/>
+                </a:solidFill>
+                <a:latin typeface="Calibri" panose="020F0502020204030204"/>
+                <a:cs typeface="Courier New" panose="02070309020205020404" pitchFamily="49" charset="0"/>
+              </a:rPr>
+              <a:t>kubernetes</a:t>
+            </a:r>
+            <a:r>
+              <a:rPr kumimoji="0" lang="en-US" sz="1200" b="1" dirty="0">
+                <a:solidFill>
+                  <a:prstClr val="black"/>
+                </a:solidFill>
+                <a:latin typeface="Calibri" panose="020F0502020204030204"/>
+                <a:cs typeface="Courier New" panose="02070309020205020404" pitchFamily="49" charset="0"/>
+              </a:rPr>
+              <a:t> </a:t>
+            </a:r>
+            <a:r>
+              <a:rPr kumimoji="0" lang="en-US" sz="1200" dirty="0">
+                <a:solidFill>
+                  <a:prstClr val="black"/>
+                </a:solidFill>
+                <a:latin typeface="Calibri" panose="020F0502020204030204"/>
+                <a:cs typeface="Courier New" panose="02070309020205020404" pitchFamily="49" charset="0"/>
+              </a:rPr>
+              <a:t>to your </a:t>
+            </a:r>
+            <a:r>
+              <a:rPr kumimoji="0" lang="en-US" sz="1200" dirty="0" err="1">
+                <a:solidFill>
+                  <a:prstClr val="black"/>
+                </a:solidFill>
+                <a:latin typeface="Calibri" panose="020F0502020204030204"/>
+                <a:cs typeface="Courier New" panose="02070309020205020404" pitchFamily="49" charset="0"/>
+              </a:rPr>
+              <a:t>Github</a:t>
+            </a:r>
+            <a:r>
+              <a:rPr kumimoji="0" lang="en-US" sz="1200" dirty="0">
+                <a:solidFill>
+                  <a:prstClr val="black"/>
+                </a:solidFill>
+                <a:latin typeface="Calibri" panose="020F0502020204030204"/>
+                <a:cs typeface="Courier New" panose="02070309020205020404" pitchFamily="49" charset="0"/>
+              </a:rPr>
+              <a:t> account</a:t>
+            </a:r>
+          </a:p>
+        </p:txBody>
+      </p:sp>
+      <p:sp>
+        <p:nvSpPr>
+          <p:cNvPr id="13" name="Rounded Rectangle 12"/>
+          <p:cNvSpPr/>
+          <p:nvPr/>
+        </p:nvSpPr>
+        <p:spPr>
+          <a:xfrm>
+            <a:off x="4495552" y="4733041"/>
+            <a:ext cx="2698216" cy="392794"/>
+          </a:xfrm>
+          <a:prstGeom prst="roundRect">
+            <a:avLst/>
+          </a:prstGeom>
+          <a:solidFill>
+            <a:srgbClr val="5B9BD5"/>
+          </a:solidFill>
+          <a:ln w="12700" cap="flat" cmpd="sng" algn="ctr">
+            <a:solidFill>
+              <a:srgbClr val="0070C0"/>
+            </a:solidFill>
+            <a:prstDash val="solid"/>
+            <a:miter lim="800000"/>
+          </a:ln>
+          <a:effectLst/>
+        </p:spPr>
+        <p:txBody>
+          <a:bodyPr rtlCol="0" anchor="ctr"/>
+          <a:lstStyle/>
+          <a:p>
+            <a:pPr marL="0" marR="0" lvl="0" indent="0" algn="ctr" defTabSz="685800" eaLnBrk="1" fontAlgn="auto" latinLnBrk="0" hangingPunct="1">
+              <a:lnSpc>
+                <a:spcPct val="100000"/>
+              </a:lnSpc>
+              <a:spcBef>
+                <a:spcPts val="0"/>
+              </a:spcBef>
+              <a:spcAft>
+                <a:spcPts val="0"/>
+              </a:spcAft>
+              <a:buClrTx/>
+              <a:buSzTx/>
+              <a:buFontTx/>
+              <a:buNone/>
+              <a:tabLst/>
+              <a:defRPr/>
+            </a:pPr>
+            <a:r>
+              <a:rPr kumimoji="0" lang="en-US" sz="1200" b="0" i="0" u="none" strike="noStrike" kern="0" cap="none" spc="0" normalizeH="0" baseline="0" noProof="0" dirty="0" smtClean="0">
+                <a:ln>
+                  <a:noFill/>
+                </a:ln>
+                <a:solidFill>
+                  <a:prstClr val="white"/>
+                </a:solidFill>
+                <a:effectLst/>
+                <a:uLnTx/>
+                <a:uFillTx/>
+                <a:latin typeface="Calibri" panose="020F0502020204030204"/>
+                <a:ea typeface="+mn-ea"/>
+                <a:cs typeface="+mn-cs"/>
+              </a:rPr>
+              <a:t>$</a:t>
+            </a:r>
+            <a:r>
+              <a:rPr kumimoji="0" lang="en-US" sz="1200" b="0" i="0" u="none" strike="noStrike" kern="0" cap="none" spc="0" normalizeH="0" baseline="0" noProof="0" dirty="0" err="1" smtClean="0">
+                <a:ln>
+                  <a:noFill/>
+                </a:ln>
+                <a:solidFill>
+                  <a:prstClr val="white"/>
+                </a:solidFill>
+                <a:effectLst/>
+                <a:uLnTx/>
+                <a:uFillTx/>
+                <a:latin typeface="Calibri" panose="020F0502020204030204"/>
+                <a:ea typeface="+mn-ea"/>
+                <a:cs typeface="+mn-cs"/>
+              </a:rPr>
+              <a:t>local_working_dir</a:t>
+            </a:r>
+            <a:r>
+              <a:rPr kumimoji="0" lang="en-US" sz="1200" b="0" i="0" u="none" strike="noStrike" kern="0" cap="none" spc="0" normalizeH="0" baseline="0" noProof="0" dirty="0" smtClean="0">
+                <a:ln>
+                  <a:noFill/>
+                </a:ln>
+                <a:solidFill>
+                  <a:prstClr val="white"/>
+                </a:solidFill>
+                <a:effectLst/>
+                <a:uLnTx/>
+                <a:uFillTx/>
+                <a:latin typeface="Calibri" panose="020F0502020204030204"/>
+                <a:ea typeface="+mn-ea"/>
+                <a:cs typeface="+mn-cs"/>
+              </a:rPr>
+              <a:t>/</a:t>
+            </a:r>
+            <a:r>
+              <a:rPr kumimoji="0" lang="en-US" sz="1200" b="1" i="0" u="none" strike="noStrike" kern="0" cap="none" spc="0" normalizeH="0" baseline="0" noProof="0" dirty="0" err="1" smtClean="0">
+                <a:ln>
+                  <a:noFill/>
+                </a:ln>
+                <a:solidFill>
+                  <a:prstClr val="white"/>
+                </a:solidFill>
+                <a:effectLst/>
+                <a:uLnTx/>
+                <a:uFillTx/>
+                <a:latin typeface="Calibri" panose="020F0502020204030204"/>
+                <a:ea typeface="+mn-ea"/>
+                <a:cs typeface="+mn-cs"/>
+              </a:rPr>
+              <a:t>kubernetes</a:t>
+            </a:r>
+            <a:endParaRPr kumimoji="0" lang="en-US" sz="1200" b="1" i="0" u="none" strike="noStrike" kern="0" cap="none" spc="0" normalizeH="0" baseline="0" noProof="0" dirty="0" smtClean="0">
+              <a:ln>
+                <a:noFill/>
+              </a:ln>
+              <a:solidFill>
+                <a:prstClr val="white"/>
+              </a:solidFill>
+              <a:effectLst/>
+              <a:uLnTx/>
+              <a:uFillTx/>
+              <a:latin typeface="Calibri" panose="020F0502020204030204"/>
+              <a:ea typeface="+mn-ea"/>
+              <a:cs typeface="+mn-cs"/>
+            </a:endParaRPr>
+          </a:p>
+        </p:txBody>
+      </p:sp>
+      <p:pic>
+        <p:nvPicPr>
+          <p:cNvPr id="14" name="Picture 13"/>
+          <p:cNvPicPr>
+            <a:picLocks noChangeAspect="1"/>
+          </p:cNvPicPr>
+          <p:nvPr/>
+        </p:nvPicPr>
+        <p:blipFill>
+          <a:blip r:embed="rId3"/>
+          <a:stretch>
+            <a:fillRect/>
+          </a:stretch>
+        </p:blipFill>
+        <p:spPr>
+          <a:xfrm>
+            <a:off x="8477860" y="1436642"/>
+            <a:ext cx="950119" cy="200025"/>
+          </a:xfrm>
+          <a:prstGeom prst="rect">
+            <a:avLst/>
+          </a:prstGeom>
+        </p:spPr>
+      </p:pic>
+      <p:sp>
+        <p:nvSpPr>
+          <p:cNvPr id="15" name="Snip Single Corner Rectangle 14"/>
+          <p:cNvSpPr/>
+          <p:nvPr/>
+        </p:nvSpPr>
+        <p:spPr>
+          <a:xfrm>
+            <a:off x="4744670" y="6250054"/>
+            <a:ext cx="2021395" cy="438599"/>
+          </a:xfrm>
+          <a:prstGeom prst="snip1Rect">
+            <a:avLst/>
+          </a:prstGeom>
+          <a:solidFill>
+            <a:srgbClr val="FFC000">
+              <a:lumMod val="40000"/>
+              <a:lumOff val="60000"/>
+            </a:srgbClr>
+          </a:solidFill>
+          <a:ln w="9525" cap="flat" cmpd="sng" algn="ctr">
+            <a:solidFill>
+              <a:srgbClr val="FFC000"/>
+            </a:solidFill>
+            <a:prstDash val="solid"/>
+            <a:miter lim="800000"/>
+          </a:ln>
+          <a:effectLst/>
+        </p:spPr>
+        <p:txBody>
+          <a:bodyPr rtlCol="0" anchor="ctr"/>
+          <a:lstStyle/>
+          <a:p>
+            <a:pPr marL="0" marR="0" lvl="0" indent="0" algn="ctr" defTabSz="685800" eaLnBrk="1" fontAlgn="auto" latinLnBrk="0" hangingPunct="1">
+              <a:lnSpc>
+                <a:spcPct val="100000"/>
+              </a:lnSpc>
+              <a:spcBef>
+                <a:spcPts val="0"/>
+              </a:spcBef>
+              <a:spcAft>
+                <a:spcPts val="0"/>
+              </a:spcAft>
+              <a:buClrTx/>
+              <a:buSzTx/>
+              <a:buFontTx/>
+              <a:buNone/>
+              <a:tabLst/>
+              <a:defRPr/>
+            </a:pPr>
+            <a:r>
+              <a:rPr kumimoji="0" lang="en-US" sz="1200" b="0" i="0" u="none" strike="noStrike" kern="0" cap="none" spc="0" normalizeH="0" baseline="0" noProof="0" dirty="0" smtClean="0">
+                <a:ln>
+                  <a:noFill/>
+                </a:ln>
+                <a:solidFill>
+                  <a:prstClr val="black">
+                    <a:lumMod val="75000"/>
+                    <a:lumOff val="25000"/>
+                  </a:prstClr>
+                </a:solidFill>
+                <a:effectLst/>
+                <a:uLnTx/>
+                <a:uFillTx/>
+                <a:latin typeface="Calibri" panose="020F0502020204030204"/>
+                <a:ea typeface="+mn-ea"/>
+                <a:cs typeface="+mn-cs"/>
+              </a:rPr>
+              <a:t>Branch: </a:t>
+            </a:r>
+            <a:r>
+              <a:rPr kumimoji="0" lang="en-US" sz="1200" b="0" i="0" u="none" strike="noStrike" kern="0" cap="none" spc="0" normalizeH="0" baseline="0" noProof="0" dirty="0" err="1" smtClean="0">
+                <a:ln>
+                  <a:noFill/>
+                </a:ln>
+                <a:solidFill>
+                  <a:prstClr val="black">
+                    <a:lumMod val="75000"/>
+                    <a:lumOff val="25000"/>
+                  </a:prstClr>
+                </a:solidFill>
+                <a:effectLst/>
+                <a:uLnTx/>
+                <a:uFillTx/>
+                <a:latin typeface="Calibri" panose="020F0502020204030204"/>
+                <a:ea typeface="+mn-ea"/>
+                <a:cs typeface="+mn-cs"/>
+              </a:rPr>
+              <a:t>mybranch</a:t>
+            </a:r>
+            <a:endParaRPr kumimoji="0" lang="en-US" sz="1200" b="0" i="0" u="none" strike="noStrike" kern="0" cap="none" spc="0" normalizeH="0" baseline="0" noProof="0" dirty="0" smtClean="0">
+              <a:ln>
+                <a:noFill/>
+              </a:ln>
+              <a:solidFill>
+                <a:prstClr val="black">
+                  <a:lumMod val="75000"/>
+                  <a:lumOff val="25000"/>
+                </a:prstClr>
+              </a:solidFill>
+              <a:effectLst/>
+              <a:uLnTx/>
+              <a:uFillTx/>
+              <a:latin typeface="Calibri" panose="020F0502020204030204"/>
+              <a:ea typeface="+mn-ea"/>
+              <a:cs typeface="+mn-cs"/>
+            </a:endParaRPr>
+          </a:p>
+        </p:txBody>
+      </p:sp>
+      <p:sp>
+        <p:nvSpPr>
+          <p:cNvPr id="16" name="TextBox 15"/>
+          <p:cNvSpPr txBox="1"/>
+          <p:nvPr/>
+        </p:nvSpPr>
+        <p:spPr>
+          <a:xfrm>
+            <a:off x="6077897" y="5223102"/>
+            <a:ext cx="2693967" cy="830997"/>
+          </a:xfrm>
+          <a:prstGeom prst="rect">
+            <a:avLst/>
+          </a:prstGeom>
+          <a:noFill/>
+        </p:spPr>
+        <p:txBody>
+          <a:bodyPr wrap="square" rtlCol="0">
+            <a:spAutoFit/>
+          </a:bodyPr>
+          <a:lstStyle/>
+          <a:p>
+            <a:pPr defTabSz="685800" fontAlgn="auto">
+              <a:spcBef>
+                <a:spcPts val="0"/>
+              </a:spcBef>
+              <a:spcAft>
+                <a:spcPts val="0"/>
+              </a:spcAft>
+            </a:pPr>
+            <a:r>
+              <a:rPr kumimoji="0" lang="en-US" sz="1200" b="1" dirty="0">
+                <a:solidFill>
+                  <a:srgbClr val="FF0000"/>
+                </a:solidFill>
+                <a:latin typeface="Calibri" panose="020F0502020204030204"/>
+              </a:rPr>
+              <a:t>Step 4.</a:t>
+            </a:r>
+            <a:r>
+              <a:rPr kumimoji="0" lang="en-US" sz="1200" b="1" dirty="0">
+                <a:solidFill>
+                  <a:srgbClr val="0070C0"/>
+                </a:solidFill>
+                <a:latin typeface="Calibri" panose="020F0502020204030204"/>
+              </a:rPr>
+              <a:t> </a:t>
+            </a:r>
+            <a:r>
+              <a:rPr kumimoji="0" lang="en-US" sz="1200" b="1" dirty="0">
+                <a:solidFill>
+                  <a:prstClr val="black"/>
+                </a:solidFill>
+                <a:latin typeface="Calibri" panose="020F0502020204030204"/>
+              </a:rPr>
+              <a:t>Create a branch to add a new feature or fix issues</a:t>
+            </a:r>
+          </a:p>
+          <a:p>
+            <a:pPr defTabSz="685800" fontAlgn="auto">
+              <a:spcBef>
+                <a:spcPts val="0"/>
+              </a:spcBef>
+              <a:spcAft>
+                <a:spcPts val="0"/>
+              </a:spcAft>
+            </a:pPr>
+            <a:endParaRPr kumimoji="0" lang="en-US" sz="1200" dirty="0">
+              <a:solidFill>
+                <a:prstClr val="black"/>
+              </a:solidFill>
+              <a:latin typeface="Calibri" panose="020F0502020204030204"/>
+            </a:endParaRPr>
+          </a:p>
+          <a:p>
+            <a:pPr defTabSz="685800" fontAlgn="auto">
+              <a:spcBef>
+                <a:spcPts val="0"/>
+              </a:spcBef>
+              <a:spcAft>
+                <a:spcPts val="0"/>
+              </a:spcAft>
+            </a:pPr>
+            <a:r>
+              <a:rPr kumimoji="0" lang="en-US" sz="1200" dirty="0">
+                <a:solidFill>
+                  <a:prstClr val="black"/>
+                </a:solidFill>
+                <a:latin typeface="Calibri" panose="020F0502020204030204"/>
+              </a:rPr>
+              <a:t>$ </a:t>
+            </a:r>
+            <a:r>
+              <a:rPr kumimoji="0" lang="en-US" sz="1200" dirty="0" err="1">
+                <a:solidFill>
+                  <a:prstClr val="black"/>
+                </a:solidFill>
+                <a:latin typeface="Calibri" panose="020F0502020204030204"/>
+              </a:rPr>
+              <a:t>git</a:t>
+            </a:r>
+            <a:r>
+              <a:rPr kumimoji="0" lang="en-US" sz="1200" dirty="0">
+                <a:solidFill>
+                  <a:prstClr val="black"/>
+                </a:solidFill>
+                <a:latin typeface="Calibri" panose="020F0502020204030204"/>
+              </a:rPr>
+              <a:t> checkout –b </a:t>
+            </a:r>
+            <a:r>
+              <a:rPr kumimoji="0" lang="en-US" sz="1200" dirty="0" err="1">
+                <a:solidFill>
+                  <a:prstClr val="black"/>
+                </a:solidFill>
+                <a:latin typeface="Calibri" panose="020F0502020204030204"/>
+              </a:rPr>
+              <a:t>mybranch</a:t>
+            </a:r>
+            <a:endParaRPr kumimoji="0" lang="en-US" sz="1200" dirty="0">
+              <a:solidFill>
+                <a:prstClr val="black"/>
+              </a:solidFill>
+              <a:latin typeface="Calibri" panose="020F0502020204030204"/>
+            </a:endParaRPr>
+          </a:p>
+        </p:txBody>
+      </p:sp>
+      <p:sp>
+        <p:nvSpPr>
+          <p:cNvPr id="17" name="TextBox 16"/>
+          <p:cNvSpPr txBox="1"/>
+          <p:nvPr/>
+        </p:nvSpPr>
+        <p:spPr>
+          <a:xfrm>
+            <a:off x="1604663" y="1543261"/>
+            <a:ext cx="3308275" cy="1846659"/>
+          </a:xfrm>
+          <a:prstGeom prst="rect">
+            <a:avLst/>
+          </a:prstGeom>
+          <a:noFill/>
+        </p:spPr>
+        <p:txBody>
+          <a:bodyPr wrap="square" rtlCol="0">
+            <a:spAutoFit/>
+          </a:bodyPr>
+          <a:lstStyle/>
+          <a:p>
+            <a:pPr defTabSz="685800" fontAlgn="auto">
+              <a:spcBef>
+                <a:spcPts val="0"/>
+              </a:spcBef>
+              <a:spcAft>
+                <a:spcPts val="0"/>
+              </a:spcAft>
+            </a:pPr>
+            <a:r>
+              <a:rPr kumimoji="0" lang="en-US" sz="1200" b="1" dirty="0">
+                <a:solidFill>
+                  <a:srgbClr val="FF0000"/>
+                </a:solidFill>
+                <a:latin typeface="Calibri" panose="020F0502020204030204"/>
+              </a:rPr>
+              <a:t>Step 3.</a:t>
+            </a:r>
+            <a:r>
+              <a:rPr kumimoji="0" lang="en-US" sz="1200" b="1" dirty="0">
+                <a:solidFill>
+                  <a:srgbClr val="0070C0"/>
+                </a:solidFill>
+                <a:latin typeface="Calibri" panose="020F0502020204030204"/>
+              </a:rPr>
+              <a:t> </a:t>
+            </a:r>
+            <a:r>
+              <a:rPr kumimoji="0" lang="en-US" sz="1200" b="1" dirty="0">
+                <a:solidFill>
+                  <a:prstClr val="black"/>
+                </a:solidFill>
+                <a:latin typeface="Calibri" panose="020F0502020204030204"/>
+              </a:rPr>
+              <a:t>Fetch and Rebase</a:t>
+            </a:r>
+          </a:p>
+          <a:p>
+            <a:pPr defTabSz="685800" fontAlgn="auto">
+              <a:spcBef>
+                <a:spcPts val="0"/>
+              </a:spcBef>
+              <a:spcAft>
+                <a:spcPts val="0"/>
+              </a:spcAft>
+            </a:pPr>
+            <a:endParaRPr kumimoji="0" lang="en-US" sz="1200" dirty="0">
+              <a:solidFill>
+                <a:prstClr val="black"/>
+              </a:solidFill>
+              <a:latin typeface="Calibri" panose="020F0502020204030204"/>
+            </a:endParaRPr>
+          </a:p>
+          <a:p>
+            <a:pPr defTabSz="685800" fontAlgn="auto">
+              <a:lnSpc>
+                <a:spcPct val="150000"/>
+              </a:lnSpc>
+              <a:spcBef>
+                <a:spcPts val="0"/>
+              </a:spcBef>
+              <a:spcAft>
+                <a:spcPts val="0"/>
+              </a:spcAft>
+            </a:pPr>
+            <a:r>
+              <a:rPr kumimoji="0" lang="en-US" sz="1200" dirty="0">
+                <a:solidFill>
+                  <a:prstClr val="black"/>
+                </a:solidFill>
+                <a:latin typeface="Calibri" panose="020F0502020204030204"/>
+              </a:rPr>
+              <a:t>$ </a:t>
+            </a:r>
+            <a:r>
+              <a:rPr kumimoji="0" lang="en-US" sz="1200" dirty="0" err="1">
+                <a:solidFill>
+                  <a:prstClr val="black"/>
+                </a:solidFill>
+                <a:latin typeface="Calibri" panose="020F0502020204030204"/>
+              </a:rPr>
+              <a:t>git</a:t>
+            </a:r>
+            <a:r>
+              <a:rPr kumimoji="0" lang="en-US" sz="1200" dirty="0">
+                <a:solidFill>
+                  <a:prstClr val="black"/>
+                </a:solidFill>
+                <a:latin typeface="Calibri" panose="020F0502020204030204"/>
+              </a:rPr>
+              <a:t> remote add upstream \</a:t>
+            </a:r>
+            <a:br>
+              <a:rPr kumimoji="0" lang="en-US" sz="1200" dirty="0">
+                <a:solidFill>
+                  <a:prstClr val="black"/>
+                </a:solidFill>
+                <a:latin typeface="Calibri" panose="020F0502020204030204"/>
+              </a:rPr>
+            </a:br>
+            <a:r>
+              <a:rPr kumimoji="0" lang="en-US" sz="1200" dirty="0">
+                <a:solidFill>
+                  <a:prstClr val="black"/>
+                </a:solidFill>
+                <a:latin typeface="Calibri" panose="020F0502020204030204"/>
+                <a:hlinkClick r:id="rId4"/>
+              </a:rPr>
+              <a:t>https://github.com/kubernetes/kubernetes.git</a:t>
+            </a:r>
+            <a:endParaRPr kumimoji="0" lang="en-US" sz="1200" dirty="0">
+              <a:solidFill>
+                <a:prstClr val="black"/>
+              </a:solidFill>
+              <a:latin typeface="Calibri" panose="020F0502020204030204"/>
+            </a:endParaRPr>
+          </a:p>
+          <a:p>
+            <a:pPr defTabSz="685800" fontAlgn="auto">
+              <a:lnSpc>
+                <a:spcPct val="150000"/>
+              </a:lnSpc>
+              <a:spcBef>
+                <a:spcPts val="0"/>
+              </a:spcBef>
+              <a:spcAft>
+                <a:spcPts val="0"/>
+              </a:spcAft>
+            </a:pPr>
+            <a:r>
+              <a:rPr kumimoji="0" lang="en-US" sz="1200" dirty="0">
+                <a:solidFill>
+                  <a:prstClr val="black"/>
+                </a:solidFill>
+                <a:latin typeface="Calibri" panose="020F0502020204030204"/>
+              </a:rPr>
+              <a:t>$ </a:t>
+            </a:r>
+            <a:r>
+              <a:rPr kumimoji="0" lang="en-US" sz="1200" dirty="0" err="1">
+                <a:solidFill>
+                  <a:prstClr val="black"/>
+                </a:solidFill>
+                <a:latin typeface="Calibri" panose="020F0502020204030204"/>
+              </a:rPr>
+              <a:t>git</a:t>
+            </a:r>
+            <a:r>
+              <a:rPr kumimoji="0" lang="en-US" sz="1200" dirty="0">
+                <a:solidFill>
+                  <a:prstClr val="black"/>
+                </a:solidFill>
+                <a:latin typeface="Calibri" panose="020F0502020204030204"/>
+              </a:rPr>
+              <a:t> fetch upstream</a:t>
+            </a:r>
+          </a:p>
+          <a:p>
+            <a:pPr defTabSz="685800" fontAlgn="auto">
+              <a:lnSpc>
+                <a:spcPct val="150000"/>
+              </a:lnSpc>
+              <a:spcBef>
+                <a:spcPts val="0"/>
+              </a:spcBef>
+              <a:spcAft>
+                <a:spcPts val="0"/>
+              </a:spcAft>
+            </a:pPr>
+            <a:r>
+              <a:rPr kumimoji="0" lang="en-US" sz="1200" dirty="0">
+                <a:solidFill>
+                  <a:prstClr val="black"/>
+                </a:solidFill>
+                <a:latin typeface="Calibri" panose="020F0502020204030204"/>
+              </a:rPr>
+              <a:t>$ </a:t>
+            </a:r>
+            <a:r>
+              <a:rPr kumimoji="0" lang="en-US" sz="1200" dirty="0" err="1">
+                <a:solidFill>
+                  <a:prstClr val="black"/>
+                </a:solidFill>
+                <a:latin typeface="Calibri" panose="020F0502020204030204"/>
+              </a:rPr>
+              <a:t>git</a:t>
+            </a:r>
+            <a:r>
+              <a:rPr kumimoji="0" lang="en-US" sz="1200" dirty="0">
+                <a:solidFill>
+                  <a:prstClr val="black"/>
+                </a:solidFill>
+                <a:latin typeface="Calibri" panose="020F0502020204030204"/>
+              </a:rPr>
+              <a:t> checkout master</a:t>
+            </a:r>
+          </a:p>
+          <a:p>
+            <a:pPr defTabSz="685800" fontAlgn="auto">
+              <a:lnSpc>
+                <a:spcPct val="150000"/>
+              </a:lnSpc>
+              <a:spcBef>
+                <a:spcPts val="0"/>
+              </a:spcBef>
+              <a:spcAft>
+                <a:spcPts val="0"/>
+              </a:spcAft>
+            </a:pPr>
+            <a:r>
+              <a:rPr kumimoji="0" lang="en-US" sz="1200" dirty="0">
+                <a:solidFill>
+                  <a:prstClr val="black"/>
+                </a:solidFill>
+                <a:latin typeface="Calibri" panose="020F0502020204030204"/>
+              </a:rPr>
+              <a:t>$ </a:t>
+            </a:r>
+            <a:r>
+              <a:rPr kumimoji="0" lang="en-US" sz="1200" dirty="0" err="1">
+                <a:solidFill>
+                  <a:prstClr val="black"/>
+                </a:solidFill>
+                <a:latin typeface="Calibri" panose="020F0502020204030204"/>
+              </a:rPr>
+              <a:t>git</a:t>
+            </a:r>
+            <a:r>
+              <a:rPr kumimoji="0" lang="en-US" sz="1200" dirty="0">
+                <a:solidFill>
+                  <a:prstClr val="black"/>
+                </a:solidFill>
+                <a:latin typeface="Calibri" panose="020F0502020204030204"/>
+              </a:rPr>
+              <a:t> rebase upstream/master</a:t>
+            </a:r>
+          </a:p>
+        </p:txBody>
+      </p:sp>
+      <p:sp>
+        <p:nvSpPr>
+          <p:cNvPr id="18" name="Up Arrow 17"/>
+          <p:cNvSpPr/>
+          <p:nvPr/>
+        </p:nvSpPr>
+        <p:spPr>
+          <a:xfrm>
+            <a:off x="5463149" y="5149689"/>
+            <a:ext cx="170482" cy="1044983"/>
+          </a:xfrm>
+          <a:prstGeom prst="upArrow">
+            <a:avLst/>
+          </a:prstGeom>
+          <a:solidFill>
+            <a:srgbClr val="FFC000">
+              <a:lumMod val="40000"/>
+              <a:lumOff val="60000"/>
+            </a:srgbClr>
+          </a:solidFill>
+          <a:ln w="6350" cap="flat" cmpd="sng" algn="ctr">
+            <a:solidFill>
+              <a:srgbClr val="FFC000"/>
+            </a:solidFill>
+            <a:prstDash val="solid"/>
+            <a:miter lim="800000"/>
+          </a:ln>
+          <a:effectLst/>
+        </p:spPr>
+        <p:txBody>
+          <a:bodyPr rtlCol="0" anchor="ctr"/>
+          <a:lstStyle/>
+          <a:p>
+            <a:pPr marL="0" marR="0" lvl="0" indent="0" algn="ctr" defTabSz="685800" eaLnBrk="1" fontAlgn="auto" latinLnBrk="0" hangingPunct="1">
+              <a:lnSpc>
+                <a:spcPct val="100000"/>
+              </a:lnSpc>
+              <a:spcBef>
+                <a:spcPts val="0"/>
+              </a:spcBef>
+              <a:spcAft>
+                <a:spcPts val="0"/>
+              </a:spcAft>
+              <a:buClrTx/>
+              <a:buSzTx/>
+              <a:buFontTx/>
+              <a:buNone/>
+              <a:tabLst/>
+              <a:defRPr/>
+            </a:pPr>
+            <a:endParaRPr kumimoji="0" lang="en-US" sz="1200" b="1" i="0" u="none" strike="noStrike" kern="0" cap="none" spc="0" normalizeH="0" baseline="0" noProof="0" dirty="0" smtClean="0">
+              <a:ln>
+                <a:noFill/>
+              </a:ln>
+              <a:solidFill>
+                <a:prstClr val="white"/>
+              </a:solidFill>
+              <a:effectLst/>
+              <a:uLnTx/>
+              <a:uFillTx/>
+              <a:latin typeface="Calibri" panose="020F0502020204030204"/>
+              <a:ea typeface="+mn-ea"/>
+              <a:cs typeface="+mn-cs"/>
+            </a:endParaRPr>
+          </a:p>
+        </p:txBody>
+      </p:sp>
+      <p:sp>
+        <p:nvSpPr>
+          <p:cNvPr id="19" name="Up Arrow 18"/>
+          <p:cNvSpPr/>
+          <p:nvPr/>
+        </p:nvSpPr>
+        <p:spPr>
+          <a:xfrm rot="10800000">
+            <a:off x="5972307" y="5202375"/>
+            <a:ext cx="155475" cy="976800"/>
+          </a:xfrm>
+          <a:prstGeom prst="upArrow">
+            <a:avLst/>
+          </a:prstGeom>
+          <a:solidFill>
+            <a:srgbClr val="FFC000">
+              <a:lumMod val="40000"/>
+              <a:lumOff val="60000"/>
+            </a:srgbClr>
+          </a:solidFill>
+          <a:ln w="6350" cap="flat" cmpd="sng" algn="ctr">
+            <a:solidFill>
+              <a:srgbClr val="FFC000"/>
+            </a:solidFill>
+            <a:prstDash val="solid"/>
+            <a:miter lim="800000"/>
+          </a:ln>
+          <a:effectLst/>
+        </p:spPr>
+        <p:txBody>
+          <a:bodyPr rtlCol="0" anchor="ctr"/>
+          <a:lstStyle/>
+          <a:p>
+            <a:pPr marL="0" marR="0" lvl="0" indent="0" algn="ctr" defTabSz="685800" eaLnBrk="1" fontAlgn="auto" latinLnBrk="0" hangingPunct="1">
+              <a:lnSpc>
+                <a:spcPct val="100000"/>
+              </a:lnSpc>
+              <a:spcBef>
+                <a:spcPts val="0"/>
+              </a:spcBef>
+              <a:spcAft>
+                <a:spcPts val="0"/>
+              </a:spcAft>
+              <a:buClrTx/>
+              <a:buSzTx/>
+              <a:buFontTx/>
+              <a:buNone/>
+              <a:tabLst/>
+              <a:defRPr/>
+            </a:pPr>
+            <a:endParaRPr kumimoji="0" lang="en-US" sz="1200" b="1" i="0" u="none" strike="noStrike" kern="0" cap="none" spc="0" normalizeH="0" baseline="0" noProof="0" dirty="0" smtClean="0">
+              <a:ln>
+                <a:noFill/>
+              </a:ln>
+              <a:solidFill>
+                <a:prstClr val="white"/>
+              </a:solidFill>
+              <a:effectLst/>
+              <a:uLnTx/>
+              <a:uFillTx/>
+              <a:latin typeface="Calibri" panose="020F0502020204030204"/>
+              <a:ea typeface="+mn-ea"/>
+              <a:cs typeface="+mn-cs"/>
+            </a:endParaRPr>
+          </a:p>
+        </p:txBody>
+      </p:sp>
+      <p:sp>
+        <p:nvSpPr>
+          <p:cNvPr id="20" name="TextBox 19"/>
+          <p:cNvSpPr txBox="1"/>
+          <p:nvPr/>
+        </p:nvSpPr>
+        <p:spPr>
+          <a:xfrm>
+            <a:off x="3790385" y="5226923"/>
+            <a:ext cx="2110268" cy="1292662"/>
+          </a:xfrm>
+          <a:prstGeom prst="rect">
+            <a:avLst/>
+          </a:prstGeom>
+          <a:noFill/>
+        </p:spPr>
+        <p:txBody>
+          <a:bodyPr wrap="square" rtlCol="0">
+            <a:spAutoFit/>
+          </a:bodyPr>
+          <a:lstStyle/>
+          <a:p>
+            <a:pPr defTabSz="685800" fontAlgn="auto">
+              <a:spcBef>
+                <a:spcPts val="0"/>
+              </a:spcBef>
+              <a:spcAft>
+                <a:spcPts val="0"/>
+              </a:spcAft>
+            </a:pPr>
+            <a:r>
+              <a:rPr kumimoji="0" lang="en-US" sz="1200" b="1" dirty="0">
+                <a:solidFill>
+                  <a:srgbClr val="FF0000"/>
+                </a:solidFill>
+                <a:latin typeface="Calibri" panose="020F0502020204030204"/>
+              </a:rPr>
+              <a:t>Step 5.</a:t>
+            </a:r>
+            <a:r>
+              <a:rPr kumimoji="0" lang="en-US" sz="1200" b="1" dirty="0">
+                <a:solidFill>
+                  <a:srgbClr val="0070C0"/>
+                </a:solidFill>
+                <a:latin typeface="Calibri" panose="020F0502020204030204"/>
+              </a:rPr>
+              <a:t> </a:t>
+            </a:r>
+            <a:r>
+              <a:rPr kumimoji="0" lang="en-US" sz="1200" b="1" dirty="0">
+                <a:solidFill>
+                  <a:prstClr val="black"/>
+                </a:solidFill>
+                <a:latin typeface="Calibri" panose="020F0502020204030204"/>
+              </a:rPr>
+              <a:t>Make any </a:t>
+            </a:r>
+            <a:r>
+              <a:rPr kumimoji="0" lang="en-US" sz="1200" b="1" dirty="0" smtClean="0">
+                <a:solidFill>
+                  <a:prstClr val="black"/>
+                </a:solidFill>
+                <a:latin typeface="Calibri" panose="020F0502020204030204"/>
+              </a:rPr>
+              <a:t>change</a:t>
+            </a:r>
+          </a:p>
+          <a:p>
+            <a:pPr defTabSz="685800" fontAlgn="auto">
+              <a:spcBef>
+                <a:spcPts val="0"/>
+              </a:spcBef>
+              <a:spcAft>
+                <a:spcPts val="0"/>
+              </a:spcAft>
+            </a:pPr>
+            <a:r>
+              <a:rPr kumimoji="0" lang="en-US" sz="1200" b="1" dirty="0" smtClean="0">
+                <a:solidFill>
+                  <a:prstClr val="black"/>
+                </a:solidFill>
+                <a:latin typeface="Calibri" panose="020F0502020204030204"/>
+              </a:rPr>
+              <a:t>on </a:t>
+            </a:r>
+            <a:r>
+              <a:rPr kumimoji="0" lang="en-US" sz="1200" b="1" dirty="0">
+                <a:solidFill>
+                  <a:prstClr val="black"/>
+                </a:solidFill>
+                <a:latin typeface="Calibri" panose="020F0502020204030204"/>
+              </a:rPr>
+              <a:t>the branch </a:t>
+            </a:r>
+            <a:r>
+              <a:rPr kumimoji="0" lang="en-US" sz="1200" b="1" i="1" dirty="0" err="1" smtClean="0">
+                <a:solidFill>
+                  <a:prstClr val="black"/>
+                </a:solidFill>
+                <a:latin typeface="Calibri" panose="020F0502020204030204"/>
+              </a:rPr>
+              <a:t>mybranch</a:t>
+            </a:r>
+            <a:endParaRPr kumimoji="0" lang="en-US" sz="1200" dirty="0">
+              <a:solidFill>
+                <a:prstClr val="black"/>
+              </a:solidFill>
+              <a:latin typeface="Calibri" panose="020F0502020204030204"/>
+            </a:endParaRPr>
+          </a:p>
+          <a:p>
+            <a:pPr defTabSz="685800" fontAlgn="auto">
+              <a:lnSpc>
+                <a:spcPct val="150000"/>
+              </a:lnSpc>
+              <a:spcBef>
+                <a:spcPts val="0"/>
+              </a:spcBef>
+              <a:spcAft>
+                <a:spcPts val="0"/>
+              </a:spcAft>
+            </a:pPr>
+            <a:r>
+              <a:rPr kumimoji="0" lang="en-US" sz="1200" dirty="0">
+                <a:solidFill>
+                  <a:prstClr val="black"/>
+                </a:solidFill>
+                <a:latin typeface="Calibri" panose="020F0502020204030204"/>
+              </a:rPr>
+              <a:t>$ </a:t>
+            </a:r>
+            <a:r>
+              <a:rPr kumimoji="0" lang="en-US" sz="1200" dirty="0" err="1">
+                <a:solidFill>
+                  <a:prstClr val="black"/>
+                </a:solidFill>
+                <a:latin typeface="Calibri" panose="020F0502020204030204"/>
+              </a:rPr>
+              <a:t>git</a:t>
+            </a:r>
+            <a:r>
+              <a:rPr kumimoji="0" lang="en-US" sz="1200" dirty="0">
+                <a:solidFill>
+                  <a:prstClr val="black"/>
+                </a:solidFill>
+                <a:latin typeface="Calibri" panose="020F0502020204030204"/>
+              </a:rPr>
+              <a:t> add &lt;file&gt;</a:t>
+            </a:r>
+          </a:p>
+          <a:p>
+            <a:pPr defTabSz="685800" fontAlgn="auto">
+              <a:lnSpc>
+                <a:spcPct val="150000"/>
+              </a:lnSpc>
+              <a:spcBef>
+                <a:spcPts val="0"/>
+              </a:spcBef>
+              <a:spcAft>
+                <a:spcPts val="0"/>
+              </a:spcAft>
+            </a:pPr>
+            <a:r>
+              <a:rPr kumimoji="0" lang="en-US" sz="1200" dirty="0">
+                <a:solidFill>
+                  <a:prstClr val="black"/>
+                </a:solidFill>
+                <a:latin typeface="Calibri" panose="020F0502020204030204"/>
+              </a:rPr>
+              <a:t>$ </a:t>
+            </a:r>
+            <a:r>
+              <a:rPr kumimoji="0" lang="en-US" sz="1200" dirty="0" err="1">
+                <a:solidFill>
+                  <a:prstClr val="black"/>
+                </a:solidFill>
+                <a:latin typeface="Calibri" panose="020F0502020204030204"/>
+              </a:rPr>
+              <a:t>git</a:t>
+            </a:r>
+            <a:r>
+              <a:rPr kumimoji="0" lang="en-US" sz="1200" dirty="0">
+                <a:solidFill>
+                  <a:prstClr val="black"/>
+                </a:solidFill>
+                <a:latin typeface="Calibri" panose="020F0502020204030204"/>
+              </a:rPr>
+              <a:t> </a:t>
+            </a:r>
+            <a:r>
+              <a:rPr kumimoji="0" lang="en-US" sz="1200" dirty="0" smtClean="0">
+                <a:solidFill>
+                  <a:prstClr val="black"/>
+                </a:solidFill>
+                <a:latin typeface="Calibri" panose="020F0502020204030204"/>
+              </a:rPr>
+              <a:t>commit</a:t>
+            </a:r>
+          </a:p>
+          <a:p>
+            <a:pPr defTabSz="685800" fontAlgn="auto">
+              <a:lnSpc>
+                <a:spcPct val="150000"/>
+              </a:lnSpc>
+              <a:spcBef>
+                <a:spcPts val="0"/>
+              </a:spcBef>
+              <a:spcAft>
+                <a:spcPts val="0"/>
+              </a:spcAft>
+            </a:pPr>
+            <a:endParaRPr kumimoji="0" lang="en-US" sz="1200" dirty="0">
+              <a:solidFill>
+                <a:prstClr val="black"/>
+              </a:solidFill>
+              <a:latin typeface="Calibri" panose="020F0502020204030204"/>
+            </a:endParaRPr>
+          </a:p>
+        </p:txBody>
+      </p:sp>
+      <p:sp>
+        <p:nvSpPr>
+          <p:cNvPr id="21" name="TextBox 20"/>
+          <p:cNvSpPr txBox="1"/>
+          <p:nvPr/>
+        </p:nvSpPr>
+        <p:spPr>
+          <a:xfrm>
+            <a:off x="4456642" y="3288275"/>
+            <a:ext cx="2737126" cy="738664"/>
+          </a:xfrm>
+          <a:prstGeom prst="rect">
+            <a:avLst/>
+          </a:prstGeom>
+          <a:noFill/>
+        </p:spPr>
+        <p:txBody>
+          <a:bodyPr wrap="square" rtlCol="0">
+            <a:spAutoFit/>
+          </a:bodyPr>
+          <a:lstStyle/>
+          <a:p>
+            <a:pPr defTabSz="685800" fontAlgn="auto">
+              <a:spcBef>
+                <a:spcPts val="0"/>
+              </a:spcBef>
+              <a:spcAft>
+                <a:spcPts val="0"/>
+              </a:spcAft>
+            </a:pPr>
+            <a:r>
+              <a:rPr kumimoji="0" lang="en-US" sz="1200" b="1" dirty="0">
+                <a:solidFill>
+                  <a:srgbClr val="FF0000"/>
+                </a:solidFill>
+                <a:latin typeface="Calibri" panose="020F0502020204030204"/>
+              </a:rPr>
+              <a:t>Step 6. </a:t>
+            </a:r>
+            <a:r>
+              <a:rPr kumimoji="0" lang="en-US" sz="1200" b="1" dirty="0">
+                <a:solidFill>
+                  <a:prstClr val="black"/>
+                </a:solidFill>
+                <a:latin typeface="Calibri" panose="020F0502020204030204"/>
+              </a:rPr>
+              <a:t>Push branch </a:t>
+            </a:r>
+            <a:r>
+              <a:rPr kumimoji="0" lang="en-US" sz="1200" b="1" i="1" dirty="0" err="1">
+                <a:solidFill>
+                  <a:prstClr val="black"/>
+                </a:solidFill>
+                <a:latin typeface="Calibri" panose="020F0502020204030204"/>
+              </a:rPr>
+              <a:t>mybranch</a:t>
+            </a:r>
+            <a:r>
+              <a:rPr kumimoji="0" lang="en-US" sz="1200" b="1" i="1" dirty="0">
+                <a:solidFill>
+                  <a:prstClr val="black"/>
+                </a:solidFill>
+                <a:latin typeface="Calibri" panose="020F0502020204030204"/>
+              </a:rPr>
+              <a:t> </a:t>
+            </a:r>
+            <a:r>
+              <a:rPr kumimoji="0" lang="en-US" sz="1200" b="1" dirty="0" smtClean="0">
+                <a:solidFill>
+                  <a:prstClr val="black"/>
+                </a:solidFill>
+                <a:latin typeface="Calibri" panose="020F0502020204030204"/>
+              </a:rPr>
+              <a:t>to</a:t>
+            </a:r>
+          </a:p>
+          <a:p>
+            <a:pPr defTabSz="685800" fontAlgn="auto">
+              <a:spcBef>
+                <a:spcPts val="0"/>
+              </a:spcBef>
+              <a:spcAft>
+                <a:spcPts val="0"/>
+              </a:spcAft>
+            </a:pPr>
+            <a:r>
+              <a:rPr kumimoji="0" lang="en-US" sz="1200" b="1" dirty="0" smtClean="0">
+                <a:solidFill>
+                  <a:prstClr val="black"/>
+                </a:solidFill>
+                <a:latin typeface="Calibri" panose="020F0502020204030204"/>
+              </a:rPr>
+              <a:t>your </a:t>
+            </a:r>
+            <a:r>
+              <a:rPr kumimoji="0" lang="en-US" sz="1200" b="1" dirty="0">
+                <a:solidFill>
+                  <a:prstClr val="black"/>
+                </a:solidFill>
+                <a:latin typeface="Calibri" panose="020F0502020204030204"/>
+              </a:rPr>
+              <a:t>forked repo on github.com</a:t>
+            </a:r>
+            <a:endParaRPr kumimoji="0" lang="en-US" sz="1200" dirty="0">
+              <a:solidFill>
+                <a:prstClr val="black"/>
+              </a:solidFill>
+              <a:latin typeface="Calibri" panose="020F0502020204030204"/>
+            </a:endParaRPr>
+          </a:p>
+          <a:p>
+            <a:pPr defTabSz="685800" fontAlgn="auto">
+              <a:lnSpc>
+                <a:spcPct val="150000"/>
+              </a:lnSpc>
+              <a:spcBef>
+                <a:spcPts val="0"/>
+              </a:spcBef>
+              <a:spcAft>
+                <a:spcPts val="0"/>
+              </a:spcAft>
+            </a:pPr>
+            <a:r>
+              <a:rPr kumimoji="0" lang="en-US" sz="1200" dirty="0">
+                <a:solidFill>
+                  <a:prstClr val="black"/>
+                </a:solidFill>
+                <a:latin typeface="Calibri" panose="020F0502020204030204"/>
+              </a:rPr>
+              <a:t>$ </a:t>
+            </a:r>
+            <a:r>
+              <a:rPr kumimoji="0" lang="en-US" sz="1200" dirty="0" err="1">
+                <a:solidFill>
+                  <a:prstClr val="black"/>
+                </a:solidFill>
+                <a:latin typeface="Calibri" panose="020F0502020204030204"/>
+              </a:rPr>
+              <a:t>git</a:t>
+            </a:r>
+            <a:r>
+              <a:rPr kumimoji="0" lang="en-US" sz="1200" dirty="0">
+                <a:solidFill>
+                  <a:prstClr val="black"/>
+                </a:solidFill>
+                <a:latin typeface="Calibri" panose="020F0502020204030204"/>
+              </a:rPr>
+              <a:t> push -f $</a:t>
+            </a:r>
+            <a:r>
+              <a:rPr kumimoji="0" lang="en-US" sz="1200" dirty="0" err="1">
+                <a:solidFill>
+                  <a:prstClr val="black"/>
+                </a:solidFill>
+                <a:latin typeface="Calibri" panose="020F0502020204030204"/>
+              </a:rPr>
+              <a:t>remotename</a:t>
+            </a:r>
+            <a:r>
+              <a:rPr kumimoji="0" lang="en-US" sz="1200" dirty="0">
+                <a:solidFill>
+                  <a:prstClr val="black"/>
+                </a:solidFill>
+                <a:latin typeface="Calibri" panose="020F0502020204030204"/>
+              </a:rPr>
+              <a:t> </a:t>
+            </a:r>
+            <a:r>
+              <a:rPr kumimoji="0" lang="en-US" sz="1200" dirty="0" err="1">
+                <a:solidFill>
+                  <a:prstClr val="black"/>
+                </a:solidFill>
+                <a:latin typeface="Calibri" panose="020F0502020204030204"/>
+              </a:rPr>
+              <a:t>mybranch</a:t>
+            </a:r>
+            <a:endParaRPr kumimoji="0" lang="en-US" sz="1200" dirty="0">
+              <a:solidFill>
+                <a:prstClr val="black"/>
+              </a:solidFill>
+              <a:latin typeface="Calibri" panose="020F0502020204030204"/>
+            </a:endParaRPr>
+          </a:p>
+        </p:txBody>
+      </p:sp>
+      <p:sp>
+        <p:nvSpPr>
+          <p:cNvPr id="22" name="Bent Arrow 21"/>
+          <p:cNvSpPr/>
+          <p:nvPr/>
+        </p:nvSpPr>
+        <p:spPr>
+          <a:xfrm rot="16200000">
+            <a:off x="4969314" y="-80282"/>
+            <a:ext cx="377264" cy="1934787"/>
+          </a:xfrm>
+          <a:prstGeom prst="bentArrow">
+            <a:avLst/>
+          </a:prstGeom>
+          <a:solidFill>
+            <a:srgbClr val="32C754"/>
+          </a:solidFill>
+          <a:ln w="19050" cap="flat" cmpd="sng" algn="ctr">
+            <a:noFill/>
+            <a:prstDash val="solid"/>
+            <a:miter lim="800000"/>
+          </a:ln>
+          <a:effectLst/>
+        </p:spPr>
+        <p:txBody>
+          <a:bodyPr rtlCol="0" anchor="ctr"/>
+          <a:lstStyle/>
+          <a:p>
+            <a:pPr marL="0" marR="0" lvl="0" indent="0" algn="ctr" defTabSz="685800" eaLnBrk="1" fontAlgn="auto" latinLnBrk="0" hangingPunct="1">
+              <a:lnSpc>
+                <a:spcPct val="100000"/>
+              </a:lnSpc>
+              <a:spcBef>
+                <a:spcPts val="0"/>
+              </a:spcBef>
+              <a:spcAft>
+                <a:spcPts val="0"/>
+              </a:spcAft>
+              <a:buClrTx/>
+              <a:buSzTx/>
+              <a:buFontTx/>
+              <a:buNone/>
+              <a:tabLst/>
+              <a:defRPr/>
+            </a:pPr>
+            <a:endParaRPr kumimoji="0" lang="en-US" sz="1200" b="0" i="0" u="none" strike="noStrike" kern="0" cap="none" spc="0" normalizeH="0" baseline="0" noProof="0" smtClean="0">
+              <a:ln>
+                <a:noFill/>
+              </a:ln>
+              <a:solidFill>
+                <a:prstClr val="black"/>
+              </a:solidFill>
+              <a:effectLst/>
+              <a:uLnTx/>
+              <a:uFillTx/>
+              <a:latin typeface="Calibri" panose="020F0502020204030204"/>
+              <a:ea typeface="+mn-ea"/>
+              <a:cs typeface="+mn-cs"/>
+            </a:endParaRPr>
+          </a:p>
+        </p:txBody>
+      </p:sp>
+      <p:sp>
+        <p:nvSpPr>
+          <p:cNvPr id="23" name="TextBox 22"/>
+          <p:cNvSpPr txBox="1"/>
+          <p:nvPr/>
+        </p:nvSpPr>
+        <p:spPr>
+          <a:xfrm>
+            <a:off x="4232371" y="1026127"/>
+            <a:ext cx="2313616" cy="276999"/>
+          </a:xfrm>
+          <a:prstGeom prst="rect">
+            <a:avLst/>
+          </a:prstGeom>
+          <a:noFill/>
+        </p:spPr>
+        <p:txBody>
+          <a:bodyPr wrap="square" rtlCol="0">
+            <a:spAutoFit/>
+          </a:bodyPr>
+          <a:lstStyle/>
+          <a:p>
+            <a:pPr defTabSz="685800" fontAlgn="auto">
+              <a:spcBef>
+                <a:spcPts val="0"/>
+              </a:spcBef>
+              <a:spcAft>
+                <a:spcPts val="0"/>
+              </a:spcAft>
+            </a:pPr>
+            <a:r>
+              <a:rPr kumimoji="0" lang="en-US" sz="1200" b="1" dirty="0">
+                <a:solidFill>
+                  <a:srgbClr val="FF0000"/>
+                </a:solidFill>
+                <a:latin typeface="Calibri" panose="020F0502020204030204"/>
+              </a:rPr>
+              <a:t>Step 7.</a:t>
+            </a:r>
+            <a:r>
+              <a:rPr kumimoji="0" lang="en-US" sz="1200" dirty="0">
+                <a:solidFill>
+                  <a:srgbClr val="0070C0"/>
+                </a:solidFill>
+                <a:latin typeface="Calibri" panose="020F0502020204030204"/>
+              </a:rPr>
+              <a:t> </a:t>
+            </a:r>
+            <a:r>
+              <a:rPr kumimoji="0" lang="en-US" sz="1200" b="1" dirty="0">
+                <a:solidFill>
+                  <a:prstClr val="black"/>
+                </a:solidFill>
+                <a:latin typeface="Calibri" panose="020F0502020204030204"/>
+                <a:cs typeface="Courier New" panose="02070309020205020404" pitchFamily="49" charset="0"/>
+              </a:rPr>
+              <a:t>Create Pull Request</a:t>
+            </a:r>
+            <a:endParaRPr kumimoji="0" lang="en-US" sz="1200" dirty="0">
+              <a:solidFill>
+                <a:prstClr val="black"/>
+              </a:solidFill>
+              <a:latin typeface="Calibri" panose="020F0502020204030204"/>
+              <a:cs typeface="Courier New" panose="02070309020205020404" pitchFamily="49" charset="0"/>
+            </a:endParaRPr>
+          </a:p>
+        </p:txBody>
+      </p:sp>
+      <p:sp>
+        <p:nvSpPr>
+          <p:cNvPr id="24" name="Up Arrow 23"/>
+          <p:cNvSpPr/>
+          <p:nvPr/>
+        </p:nvSpPr>
+        <p:spPr bwMode="auto">
+          <a:xfrm>
+            <a:off x="6812545" y="1176465"/>
+            <a:ext cx="195281" cy="3519819"/>
+          </a:xfrm>
+          <a:prstGeom prst="upArrow">
+            <a:avLst/>
+          </a:prstGeom>
+          <a:solidFill>
+            <a:srgbClr val="5B9BD5"/>
+          </a:solidFill>
+          <a:ln w="9525" cap="flat" cmpd="sng" algn="ctr">
+            <a:solidFill>
+              <a:srgbClr val="0070C0"/>
+            </a:solidFill>
+            <a:prstDash val="solid"/>
+            <a:round/>
+            <a:headEnd type="none" w="med" len="med"/>
+            <a:tailEnd type="none" w="med" len="med"/>
+          </a:ln>
+          <a:effectLst/>
+          <a:extLst/>
+        </p:spPr>
+        <p:txBody>
+          <a:bodyPr vert="horz" wrap="none" lIns="91440" tIns="45720" rIns="91440" bIns="45720" numCol="1" rtlCol="0" anchor="ctr" anchorCtr="0" compatLnSpc="1">
+            <a:prstTxWarp prst="textNoShape">
+              <a:avLst/>
+            </a:prstTxWarp>
+          </a:bodyPr>
+          <a:lstStyle/>
+          <a:p>
+            <a:pPr marL="0" marR="0" indent="0" algn="ctr" defTabSz="914400" rtl="0" eaLnBrk="1" fontAlgn="ctr" latinLnBrk="0" hangingPunct="1">
+              <a:lnSpc>
+                <a:spcPct val="100000"/>
+              </a:lnSpc>
+              <a:spcBef>
+                <a:spcPct val="0"/>
+              </a:spcBef>
+              <a:spcAft>
+                <a:spcPct val="0"/>
+              </a:spcAft>
+              <a:buClrTx/>
+              <a:buSzTx/>
+              <a:buFontTx/>
+              <a:buNone/>
+              <a:tabLst/>
+            </a:pPr>
+            <a:endParaRPr kumimoji="1" lang="en-US" sz="1200" b="0" i="0" u="none" strike="noStrike" cap="none" normalizeH="0" baseline="0" smtClean="0">
+              <a:ln>
+                <a:noFill/>
+              </a:ln>
+              <a:solidFill>
+                <a:srgbClr val="000000"/>
+              </a:solidFill>
+              <a:effectLst/>
+              <a:latin typeface="ＭＳ Ｐゴシック" charset="-128"/>
+              <a:ea typeface="ＭＳ Ｐゴシック" charset="-128"/>
+            </a:endParaRPr>
+          </a:p>
+        </p:txBody>
+      </p:sp>
+      <p:sp>
+        <p:nvSpPr>
+          <p:cNvPr id="26" name="Bent Arrow 25"/>
+          <p:cNvSpPr/>
+          <p:nvPr/>
+        </p:nvSpPr>
+        <p:spPr bwMode="auto">
+          <a:xfrm flipH="1" flipV="1">
+            <a:off x="7253997" y="1176462"/>
+            <a:ext cx="1165798" cy="3949372"/>
+          </a:xfrm>
+          <a:prstGeom prst="bentArrow">
+            <a:avLst>
+              <a:gd name="adj1" fmla="val 9080"/>
+              <a:gd name="adj2" fmla="val 11268"/>
+              <a:gd name="adj3" fmla="val 14893"/>
+              <a:gd name="adj4" fmla="val 57925"/>
+            </a:avLst>
+          </a:prstGeom>
+          <a:solidFill>
+            <a:srgbClr val="A9D18E"/>
+          </a:solidFill>
+          <a:ln w="9525" cap="flat" cmpd="sng" algn="ctr">
+            <a:solidFill>
+              <a:srgbClr val="7AB850"/>
+            </a:solidFill>
+            <a:prstDash val="solid"/>
+            <a:round/>
+            <a:headEnd type="none" w="med" len="med"/>
+            <a:tailEnd type="none" w="med" len="med"/>
+          </a:ln>
+          <a:effectLst/>
+          <a:extLst/>
+        </p:spPr>
+        <p:txBody>
+          <a:bodyPr vert="horz" wrap="none" lIns="91440" tIns="45720" rIns="91440" bIns="45720" numCol="1" rtlCol="0" anchor="ctr" anchorCtr="0" compatLnSpc="1">
+            <a:prstTxWarp prst="textNoShape">
+              <a:avLst/>
+            </a:prstTxWarp>
+          </a:bodyPr>
+          <a:lstStyle/>
+          <a:p>
+            <a:pPr marL="0" marR="0" indent="0" algn="ctr" defTabSz="914400" rtl="0" eaLnBrk="1" fontAlgn="ctr" latinLnBrk="0" hangingPunct="1">
+              <a:lnSpc>
+                <a:spcPct val="100000"/>
+              </a:lnSpc>
+              <a:spcBef>
+                <a:spcPct val="0"/>
+              </a:spcBef>
+              <a:spcAft>
+                <a:spcPct val="0"/>
+              </a:spcAft>
+              <a:buClrTx/>
+              <a:buSzTx/>
+              <a:buFontTx/>
+              <a:buNone/>
+              <a:tabLst/>
+            </a:pPr>
+            <a:endParaRPr kumimoji="1" lang="en-US" sz="1200" b="0" i="0" u="none" strike="noStrike" cap="none" normalizeH="0" baseline="0" smtClean="0">
+              <a:ln>
+                <a:noFill/>
+              </a:ln>
+              <a:solidFill>
+                <a:srgbClr val="000000"/>
+              </a:solidFill>
+              <a:effectLst/>
+              <a:latin typeface="ＭＳ Ｐゴシック" charset="-128"/>
+              <a:ea typeface="ＭＳ Ｐゴシック" charset="-128"/>
+            </a:endParaRPr>
+          </a:p>
+        </p:txBody>
+      </p:sp>
+      <p:sp>
+        <p:nvSpPr>
+          <p:cNvPr id="27" name="TextBox 26"/>
+          <p:cNvSpPr txBox="1"/>
+          <p:nvPr/>
+        </p:nvSpPr>
+        <p:spPr>
+          <a:xfrm>
+            <a:off x="8419795" y="1908233"/>
+            <a:ext cx="2141157" cy="461665"/>
+          </a:xfrm>
+          <a:prstGeom prst="rect">
+            <a:avLst/>
+          </a:prstGeom>
+          <a:noFill/>
+        </p:spPr>
+        <p:txBody>
+          <a:bodyPr wrap="square" rtlCol="0">
+            <a:spAutoFit/>
+          </a:bodyPr>
+          <a:lstStyle/>
+          <a:p>
+            <a:pPr defTabSz="685800" fontAlgn="auto">
+              <a:spcBef>
+                <a:spcPts val="0"/>
+              </a:spcBef>
+              <a:spcAft>
+                <a:spcPts val="0"/>
+              </a:spcAft>
+            </a:pPr>
+            <a:r>
+              <a:rPr kumimoji="0" lang="en-US" sz="1200" b="1" dirty="0">
+                <a:solidFill>
+                  <a:srgbClr val="FF0000"/>
+                </a:solidFill>
+                <a:latin typeface="Calibri" panose="020F0502020204030204"/>
+              </a:rPr>
+              <a:t>Step 2.</a:t>
+            </a:r>
+            <a:r>
+              <a:rPr kumimoji="0" lang="en-US" sz="1200" b="1" dirty="0">
+                <a:solidFill>
+                  <a:srgbClr val="0070C0"/>
+                </a:solidFill>
+                <a:latin typeface="Calibri" panose="020F0502020204030204"/>
+              </a:rPr>
+              <a:t> </a:t>
+            </a:r>
+            <a:r>
+              <a:rPr kumimoji="0" lang="en-US" sz="1200" b="1" dirty="0">
+                <a:solidFill>
+                  <a:prstClr val="black"/>
+                </a:solidFill>
+                <a:latin typeface="Calibri" panose="020F0502020204030204"/>
+                <a:cs typeface="Courier New" panose="02070309020205020404" pitchFamily="49" charset="0"/>
+              </a:rPr>
+              <a:t>Clone the forked repo to your local working directory </a:t>
+            </a:r>
+          </a:p>
+        </p:txBody>
+      </p:sp>
+      <p:sp>
+        <p:nvSpPr>
+          <p:cNvPr id="2" name="TextBox 1"/>
+          <p:cNvSpPr txBox="1"/>
+          <p:nvPr/>
+        </p:nvSpPr>
+        <p:spPr>
+          <a:xfrm>
+            <a:off x="1068552" y="5330132"/>
+            <a:ext cx="2597849" cy="646331"/>
+          </a:xfrm>
+          <a:prstGeom prst="rect">
+            <a:avLst/>
+          </a:prstGeom>
+          <a:noFill/>
+          <a:ln w="9525">
+            <a:solidFill>
+              <a:schemeClr val="tx1"/>
+            </a:solidFill>
+          </a:ln>
+        </p:spPr>
+        <p:txBody>
+          <a:bodyPr wrap="square" rtlCol="0">
+            <a:spAutoFit/>
+          </a:bodyPr>
+          <a:lstStyle/>
+          <a:p>
+            <a:r>
+              <a:rPr lang="en-US" sz="1200" dirty="0" smtClean="0"/>
+              <a:t>After </a:t>
+            </a:r>
+            <a:r>
+              <a:rPr lang="en-US" sz="1200" b="1" dirty="0">
+                <a:solidFill>
+                  <a:srgbClr val="FF0000"/>
+                </a:solidFill>
+              </a:rPr>
+              <a:t>Step </a:t>
+            </a:r>
+            <a:r>
+              <a:rPr lang="en-US" sz="1200" b="1" dirty="0" smtClean="0">
+                <a:solidFill>
+                  <a:srgbClr val="FF0000"/>
+                </a:solidFill>
+              </a:rPr>
+              <a:t>7.</a:t>
+            </a:r>
+            <a:r>
+              <a:rPr lang="en-US" sz="1200" dirty="0" smtClean="0"/>
+              <a:t>, if has any </a:t>
+            </a:r>
+            <a:r>
+              <a:rPr lang="en-US" sz="1200" dirty="0" err="1" smtClean="0"/>
+              <a:t>futher</a:t>
+            </a:r>
+            <a:r>
+              <a:rPr lang="en-US" sz="1200" dirty="0" smtClean="0"/>
+              <a:t> modification of source codes:</a:t>
+            </a:r>
+          </a:p>
+          <a:p>
+            <a:endParaRPr lang="en-US" sz="1200" dirty="0"/>
+          </a:p>
+        </p:txBody>
+      </p:sp>
+      <p:sp>
+        <p:nvSpPr>
+          <p:cNvPr id="28" name="TextBox 27"/>
+          <p:cNvSpPr txBox="1"/>
+          <p:nvPr/>
+        </p:nvSpPr>
+        <p:spPr>
+          <a:xfrm>
+            <a:off x="8396751" y="2367869"/>
+            <a:ext cx="3606684" cy="461665"/>
+          </a:xfrm>
+          <a:prstGeom prst="rect">
+            <a:avLst/>
+          </a:prstGeom>
+          <a:noFill/>
+        </p:spPr>
+        <p:txBody>
+          <a:bodyPr wrap="square" rtlCol="0">
+            <a:spAutoFit/>
+          </a:bodyPr>
+          <a:lstStyle/>
+          <a:p>
+            <a:pPr defTabSz="685800" fontAlgn="auto">
+              <a:spcBef>
+                <a:spcPts val="0"/>
+              </a:spcBef>
+              <a:spcAft>
+                <a:spcPts val="0"/>
+              </a:spcAft>
+            </a:pPr>
+            <a:r>
+              <a:rPr kumimoji="0" lang="en-US" sz="1200" dirty="0">
+                <a:solidFill>
+                  <a:prstClr val="black"/>
+                </a:solidFill>
+                <a:latin typeface="Calibri" panose="020F0502020204030204"/>
+                <a:cs typeface="Courier New" panose="02070309020205020404" pitchFamily="49" charset="0"/>
+              </a:rPr>
+              <a:t>$ </a:t>
+            </a:r>
+            <a:r>
+              <a:rPr kumimoji="0" lang="en-US" altLang="en-US" sz="1200" dirty="0" err="1">
+                <a:solidFill>
+                  <a:prstClr val="black"/>
+                </a:solidFill>
+                <a:latin typeface="Calibri" panose="020F0502020204030204"/>
+              </a:rPr>
+              <a:t>git</a:t>
+            </a:r>
+            <a:r>
+              <a:rPr kumimoji="0" lang="en-US" altLang="en-US" sz="1200" dirty="0">
+                <a:solidFill>
+                  <a:prstClr val="black"/>
+                </a:solidFill>
+                <a:latin typeface="Calibri" panose="020F0502020204030204"/>
+              </a:rPr>
+              <a:t> clone </a:t>
+            </a:r>
+            <a:r>
+              <a:rPr kumimoji="0" lang="en-US" altLang="en-US" sz="1200" dirty="0" smtClean="0">
+                <a:solidFill>
+                  <a:prstClr val="black"/>
+                </a:solidFill>
+                <a:latin typeface="Calibri" panose="020F0502020204030204"/>
+              </a:rPr>
+              <a:t>https</a:t>
+            </a:r>
+            <a:r>
+              <a:rPr kumimoji="0" lang="en-US" altLang="en-US" sz="1200" dirty="0">
+                <a:solidFill>
+                  <a:prstClr val="black"/>
+                </a:solidFill>
+                <a:latin typeface="Calibri" panose="020F0502020204030204"/>
+              </a:rPr>
+              <a:t>://github.com/$user/kubernetes.git </a:t>
+            </a:r>
+          </a:p>
+          <a:p>
+            <a:pPr defTabSz="685800" fontAlgn="auto">
+              <a:spcBef>
+                <a:spcPts val="0"/>
+              </a:spcBef>
+              <a:spcAft>
+                <a:spcPts val="0"/>
+              </a:spcAft>
+            </a:pPr>
+            <a:endParaRPr kumimoji="0" lang="en-US" sz="1200" dirty="0">
+              <a:solidFill>
+                <a:prstClr val="black"/>
+              </a:solidFill>
+              <a:latin typeface="Calibri" panose="020F0502020204030204"/>
+            </a:endParaRPr>
+          </a:p>
+        </p:txBody>
+      </p:sp>
+      <p:pic>
+        <p:nvPicPr>
+          <p:cNvPr id="29" name="Picture 28"/>
+          <p:cNvPicPr>
+            <a:picLocks noChangeAspect="1"/>
+          </p:cNvPicPr>
+          <p:nvPr/>
+        </p:nvPicPr>
+        <p:blipFill>
+          <a:blip r:embed="rId5">
+            <a:extLst>
+              <a:ext uri="{28A0092B-C50C-407E-A947-70E740481C1C}">
+                <a14:useLocalDpi xmlns:a14="http://schemas.microsoft.com/office/drawing/2010/main" val="0"/>
+              </a:ext>
+            </a:extLst>
+          </a:blip>
+          <a:stretch>
+            <a:fillRect/>
+          </a:stretch>
+        </p:blipFill>
+        <p:spPr>
+          <a:xfrm>
+            <a:off x="4695454" y="1249566"/>
+            <a:ext cx="1350501" cy="233420"/>
+          </a:xfrm>
+          <a:prstGeom prst="rect">
+            <a:avLst/>
+          </a:prstGeom>
+        </p:spPr>
+      </p:pic>
+      <p:sp>
+        <p:nvSpPr>
+          <p:cNvPr id="3" name="Rounded Rectangle 2"/>
+          <p:cNvSpPr/>
+          <p:nvPr/>
+        </p:nvSpPr>
+        <p:spPr>
+          <a:xfrm>
+            <a:off x="1068552" y="6033177"/>
+            <a:ext cx="2597849" cy="407667"/>
+          </a:xfrm>
+          <a:prstGeom prst="roundRect">
+            <a:avLst/>
+          </a:prstGeom>
+          <a:solidFill>
+            <a:schemeClr val="accent5">
+              <a:lumMod val="40000"/>
+              <a:lumOff val="60000"/>
+            </a:schemeClr>
+          </a:solidFill>
+          <a:ln w="9525"/>
+        </p:spPr>
+        <p:style>
+          <a:lnRef idx="2">
+            <a:schemeClr val="accent1">
+              <a:shade val="50000"/>
+            </a:schemeClr>
+          </a:lnRef>
+          <a:fillRef idx="1">
+            <a:schemeClr val="accent1"/>
+          </a:fillRef>
+          <a:effectRef idx="0">
+            <a:schemeClr val="accent1"/>
+          </a:effectRef>
+          <a:fontRef idx="minor">
+            <a:schemeClr val="lt1"/>
+          </a:fontRef>
+        </p:style>
+        <p:txBody>
+          <a:bodyPr rtlCol="0" anchor="ctr"/>
+          <a:lstStyle/>
+          <a:p>
+            <a:r>
+              <a:rPr lang="en-US" sz="1200" dirty="0">
+                <a:solidFill>
+                  <a:schemeClr val="tx1"/>
+                </a:solidFill>
+              </a:rPr>
+              <a:t>$ </a:t>
+            </a:r>
+            <a:r>
+              <a:rPr lang="en-US" sz="1200" dirty="0" err="1">
+                <a:solidFill>
+                  <a:schemeClr val="tx1"/>
+                </a:solidFill>
+              </a:rPr>
+              <a:t>git</a:t>
+            </a:r>
+            <a:r>
+              <a:rPr lang="en-US" sz="1200" dirty="0">
+                <a:solidFill>
+                  <a:schemeClr val="tx1"/>
+                </a:solidFill>
+              </a:rPr>
+              <a:t> commit </a:t>
+            </a:r>
+            <a:r>
+              <a:rPr lang="en-US" sz="1200" dirty="0" smtClean="0">
+                <a:solidFill>
+                  <a:schemeClr val="tx1"/>
+                </a:solidFill>
+              </a:rPr>
+              <a:t>--</a:t>
+            </a:r>
+            <a:r>
+              <a:rPr lang="en-US" sz="1200" dirty="0" smtClean="0">
+                <a:solidFill>
+                  <a:schemeClr val="tx1"/>
+                </a:solidFill>
+              </a:rPr>
+              <a:t>amend</a:t>
+            </a:r>
+          </a:p>
+          <a:p>
+            <a:r>
+              <a:rPr lang="en-US" sz="1200" dirty="0" smtClean="0">
+                <a:solidFill>
+                  <a:schemeClr val="tx1"/>
+                </a:solidFill>
+              </a:rPr>
+              <a:t>$ </a:t>
+            </a:r>
+            <a:r>
+              <a:rPr lang="en-US" sz="1200" dirty="0" err="1" smtClean="0">
+                <a:solidFill>
+                  <a:schemeClr val="tx1"/>
+                </a:solidFill>
+              </a:rPr>
+              <a:t>git</a:t>
+            </a:r>
+            <a:r>
+              <a:rPr lang="en-US" sz="1200" dirty="0" smtClean="0">
+                <a:solidFill>
+                  <a:schemeClr val="tx1"/>
+                </a:solidFill>
+              </a:rPr>
+              <a:t> push –f </a:t>
+            </a:r>
+            <a:r>
+              <a:rPr lang="en-US" sz="1200" dirty="0">
+                <a:solidFill>
+                  <a:prstClr val="black"/>
+                </a:solidFill>
+              </a:rPr>
+              <a:t>$</a:t>
+            </a:r>
+            <a:r>
+              <a:rPr lang="en-US" sz="1200" dirty="0" err="1">
+                <a:solidFill>
+                  <a:prstClr val="black"/>
+                </a:solidFill>
+              </a:rPr>
+              <a:t>remotename</a:t>
+            </a:r>
+            <a:r>
+              <a:rPr lang="en-US" sz="1200" dirty="0">
+                <a:solidFill>
+                  <a:prstClr val="black"/>
+                </a:solidFill>
+              </a:rPr>
+              <a:t> </a:t>
+            </a:r>
+            <a:r>
+              <a:rPr lang="en-US" sz="1200" dirty="0" err="1">
+                <a:solidFill>
+                  <a:prstClr val="black"/>
+                </a:solidFill>
+              </a:rPr>
+              <a:t>mybranch</a:t>
+            </a:r>
+            <a:endParaRPr lang="en-US" sz="1200" dirty="0">
+              <a:solidFill>
+                <a:schemeClr val="tx1"/>
+              </a:solidFill>
+            </a:endParaRPr>
+          </a:p>
+        </p:txBody>
+      </p:sp>
+      <p:cxnSp>
+        <p:nvCxnSpPr>
+          <p:cNvPr id="31" name="Elbow Connector 30"/>
+          <p:cNvCxnSpPr>
+            <a:stCxn id="3" idx="2"/>
+            <a:endCxn id="22" idx="3"/>
+          </p:cNvCxnSpPr>
+          <p:nvPr/>
+        </p:nvCxnSpPr>
+        <p:spPr>
+          <a:xfrm rot="5400000" flipH="1" flipV="1">
+            <a:off x="454991" y="2610966"/>
+            <a:ext cx="5742364" cy="1917392"/>
+          </a:xfrm>
+          <a:prstGeom prst="bentConnector5">
+            <a:avLst>
+              <a:gd name="adj1" fmla="val -3981"/>
+              <a:gd name="adj2" fmla="val -72065"/>
+              <a:gd name="adj3" fmla="val 107760"/>
+            </a:avLst>
+          </a:prstGeom>
+          <a:ln w="12700">
+            <a:tailEnd type="triangle"/>
+          </a:ln>
+        </p:spPr>
+        <p:style>
+          <a:lnRef idx="1">
+            <a:schemeClr val="accent1"/>
+          </a:lnRef>
+          <a:fillRef idx="0">
+            <a:schemeClr val="accent1"/>
+          </a:fillRef>
+          <a:effectRef idx="0">
+            <a:schemeClr val="accent1"/>
+          </a:effectRef>
+          <a:fontRef idx="minor">
+            <a:schemeClr val="tx1"/>
+          </a:fontRef>
+        </p:style>
+      </p:cxnSp>
+      <p:sp>
+        <p:nvSpPr>
+          <p:cNvPr id="25" name="Bent Arrow 24"/>
+          <p:cNvSpPr/>
+          <p:nvPr/>
+        </p:nvSpPr>
+        <p:spPr bwMode="auto">
+          <a:xfrm flipV="1">
+            <a:off x="1497649" y="751439"/>
+            <a:ext cx="2958993" cy="4307959"/>
+          </a:xfrm>
+          <a:prstGeom prst="bentArrow">
+            <a:avLst>
+              <a:gd name="adj1" fmla="val 4160"/>
+              <a:gd name="adj2" fmla="val 5086"/>
+              <a:gd name="adj3" fmla="val 9393"/>
+              <a:gd name="adj4" fmla="val 57925"/>
+            </a:avLst>
+          </a:prstGeom>
+          <a:solidFill>
+            <a:srgbClr val="F8CBAD"/>
+          </a:solidFill>
+          <a:ln w="9525" cap="flat" cmpd="sng" algn="ctr">
+            <a:solidFill>
+              <a:srgbClr val="FF9966"/>
+            </a:solidFill>
+            <a:prstDash val="solid"/>
+            <a:round/>
+            <a:headEnd type="none" w="med" len="med"/>
+            <a:tailEnd type="none" w="med" len="med"/>
+          </a:ln>
+          <a:effectLst/>
+          <a:extLst/>
+        </p:spPr>
+        <p:txBody>
+          <a:bodyPr vert="horz" wrap="none" lIns="91440" tIns="45720" rIns="91440" bIns="45720" numCol="1" rtlCol="0" anchor="ctr" anchorCtr="0" compatLnSpc="1">
+            <a:prstTxWarp prst="textNoShape">
+              <a:avLst/>
+            </a:prstTxWarp>
+          </a:bodyPr>
+          <a:lstStyle/>
+          <a:p>
+            <a:pPr marL="0" marR="0" indent="0" algn="ctr" defTabSz="914400" rtl="0" eaLnBrk="1" fontAlgn="ctr" latinLnBrk="0" hangingPunct="1">
+              <a:lnSpc>
+                <a:spcPct val="100000"/>
+              </a:lnSpc>
+              <a:spcBef>
+                <a:spcPct val="0"/>
+              </a:spcBef>
+              <a:spcAft>
+                <a:spcPct val="0"/>
+              </a:spcAft>
+              <a:buClrTx/>
+              <a:buSzTx/>
+              <a:buFontTx/>
+              <a:buNone/>
+              <a:tabLst/>
+            </a:pPr>
+            <a:endParaRPr kumimoji="1" lang="en-US" sz="1200" b="0" i="0" u="none" strike="noStrike" cap="none" normalizeH="0" baseline="0" smtClean="0">
+              <a:ln>
+                <a:noFill/>
+              </a:ln>
+              <a:solidFill>
+                <a:srgbClr val="000000"/>
+              </a:solidFill>
+              <a:effectLst/>
+              <a:latin typeface="ＭＳ Ｐゴシック" charset="-128"/>
+              <a:ea typeface="ＭＳ Ｐゴシック" charset="-128"/>
+            </a:endParaRPr>
+          </a:p>
+        </p:txBody>
+      </p:sp>
+    </p:spTree>
+    <p:extLst>
+      <p:ext uri="{BB962C8B-B14F-4D97-AF65-F5344CB8AC3E}">
+        <p14:creationId xmlns:p14="http://schemas.microsoft.com/office/powerpoint/2010/main" val="3234603479"/>
       </p:ext>
     </p:extLst>
   </p:cSld>

</xml_diff>